<commit_message>
edits/reorder based on mock presentation
</commit_message>
<xml_diff>
--- a/slides/KeyStone_Edison.pptx
+++ b/slides/KeyStone_Edison.pptx
@@ -20,8 +20,8 @@
     <p:sldId id="352" r:id="rId8"/>
     <p:sldId id="353" r:id="rId9"/>
     <p:sldId id="374" r:id="rId10"/>
-    <p:sldId id="381" r:id="rId11"/>
-    <p:sldId id="382" r:id="rId12"/>
+    <p:sldId id="382" r:id="rId11"/>
+    <p:sldId id="381" r:id="rId12"/>
     <p:sldId id="383" r:id="rId13"/>
     <p:sldId id="355" r:id="rId14"/>
     <p:sldId id="356" r:id="rId15"/>
@@ -377,7 +377,7 @@
     </p:spTree>
     <p:extLst>
       <p:ext uri="{BB962C8B-B14F-4D97-AF65-F5344CB8AC3E}">
-        <p14:creationId xmlns:p14="http://schemas.microsoft.com/office/powerpoint/2010/main" val="4170102886"/>
+        <p14:creationId xmlns:p14="http://schemas.microsoft.com/office/powerpoint/2010/main" xmlns="" val="4170102886"/>
       </p:ext>
     </p:extLst>
   </p:cSld>
@@ -690,7 +690,7 @@
     </p:spTree>
     <p:extLst>
       <p:ext uri="{BB962C8B-B14F-4D97-AF65-F5344CB8AC3E}">
-        <p14:creationId xmlns:p14="http://schemas.microsoft.com/office/powerpoint/2010/main" val="419590164"/>
+        <p14:creationId xmlns:p14="http://schemas.microsoft.com/office/powerpoint/2010/main" xmlns="" val="419590164"/>
       </p:ext>
     </p:extLst>
   </p:cSld>
@@ -5992,7 +5992,11 @@
           <a:p>
             <a:r>
               <a:rPr lang="en-US" dirty="0" smtClean="0"/>
-              <a:t>Ran Katzur</a:t>
+              <a:t>Ran </a:t>
+            </a:r>
+            <a:r>
+              <a:rPr lang="en-US" dirty="0" smtClean="0"/>
+              <a:t>Katzur, Senior Applications Engineer, Training Lead</a:t>
             </a:r>
             <a:endParaRPr lang="en-US" dirty="0"/>
           </a:p>
@@ -6058,6 +6062,371 @@
       </p:grpSpPr>
       <p:sp>
         <p:nvSpPr>
+          <p:cNvPr id="4" name="Title 3"/>
+          <p:cNvSpPr>
+            <a:spLocks noGrp="1"/>
+          </p:cNvSpPr>
+          <p:nvPr>
+            <p:ph type="title"/>
+          </p:nvPr>
+        </p:nvSpPr>
+        <p:spPr>
+          <a:xfrm>
+            <a:off x="457200" y="274638"/>
+            <a:ext cx="8229600" cy="715962"/>
+          </a:xfrm>
+        </p:spPr>
+        <p:txBody>
+          <a:bodyPr>
+            <a:normAutofit/>
+          </a:bodyPr>
+          <a:lstStyle/>
+          <a:p>
+            <a:r>
+              <a:rPr lang="en-US" sz="4000" dirty="0" smtClean="0"/>
+              <a:t>K2E Features Summary</a:t>
+            </a:r>
+            <a:endParaRPr lang="en-US" sz="4000" dirty="0"/>
+          </a:p>
+        </p:txBody>
+      </p:sp>
+      <p:sp>
+        <p:nvSpPr>
+          <p:cNvPr id="5" name="Content Placeholder 4"/>
+          <p:cNvSpPr>
+            <a:spLocks noGrp="1"/>
+          </p:cNvSpPr>
+          <p:nvPr>
+            <p:ph idx="1"/>
+          </p:nvPr>
+        </p:nvSpPr>
+        <p:spPr>
+          <a:xfrm>
+            <a:off x="457200" y="990600"/>
+            <a:ext cx="8229600" cy="5638800"/>
+          </a:xfrm>
+        </p:spPr>
+        <p:txBody>
+          <a:bodyPr>
+            <a:normAutofit/>
+          </a:bodyPr>
+          <a:lstStyle/>
+          <a:p>
+            <a:pPr marL="285750" lvl="1" indent="-285750">
+              <a:lnSpc>
+                <a:spcPct val="90000"/>
+              </a:lnSpc>
+              <a:spcBef>
+                <a:spcPts val="600"/>
+              </a:spcBef>
+              <a:buFont typeface="Arial" panose="020B0604020202020204" pitchFamily="34" charset="0"/>
+              <a:buChar char="•"/>
+              <a:defRPr/>
+            </a:pPr>
+            <a:r>
+              <a:rPr lang="en-US" sz="2400" kern="1200" dirty="0" smtClean="0">
+                <a:ea typeface="+mn-ea"/>
+              </a:rPr>
+              <a:t>Powerful Quad-ARM </a:t>
+            </a:r>
+            <a:r>
+              <a:rPr lang="en-US" sz="2400" kern="1200" dirty="0" smtClean="0">
+                <a:ea typeface="+mn-ea"/>
+              </a:rPr>
+              <a:t>A15 </a:t>
+            </a:r>
+            <a:r>
+              <a:rPr lang="en-US" sz="2400" kern="1200" dirty="0" err="1" smtClean="0">
+                <a:ea typeface="+mn-ea"/>
+              </a:rPr>
+              <a:t>CorePac</a:t>
+            </a:r>
+            <a:r>
+              <a:rPr lang="en-US" sz="2400" kern="1200" dirty="0" smtClean="0">
+                <a:ea typeface="+mn-ea"/>
+              </a:rPr>
+              <a:t> </a:t>
+            </a:r>
+            <a:r>
+              <a:rPr lang="en-US" sz="2400" kern="1200" dirty="0" smtClean="0">
+                <a:ea typeface="+mn-ea"/>
+              </a:rPr>
+              <a:t>with </a:t>
+            </a:r>
+            <a:r>
+              <a:rPr lang="en-US" sz="2400" kern="1200" dirty="0" smtClean="0">
+                <a:ea typeface="+mn-ea"/>
+              </a:rPr>
+              <a:t>0-1 DSP </a:t>
+            </a:r>
+            <a:r>
+              <a:rPr lang="en-US" sz="2400" kern="1200" dirty="0" smtClean="0">
+                <a:ea typeface="+mn-ea"/>
+              </a:rPr>
+              <a:t>CorePac support, as needed</a:t>
+            </a:r>
+          </a:p>
+          <a:p>
+            <a:pPr marL="285750" lvl="1" indent="-285750">
+              <a:lnSpc>
+                <a:spcPct val="90000"/>
+              </a:lnSpc>
+              <a:spcBef>
+                <a:spcPts val="600"/>
+              </a:spcBef>
+              <a:buFont typeface="Arial" panose="020B0604020202020204" pitchFamily="34" charset="0"/>
+              <a:buChar char="•"/>
+              <a:defRPr/>
+            </a:pPr>
+            <a:r>
+              <a:rPr lang="en-US" sz="2400" kern="1200" dirty="0" smtClean="0">
+                <a:ea typeface="+mn-ea"/>
+              </a:rPr>
+              <a:t>Robust Ethernet options:</a:t>
+            </a:r>
+          </a:p>
+          <a:p>
+            <a:pPr marL="742950" lvl="1" indent="-285750">
+              <a:lnSpc>
+                <a:spcPct val="90000"/>
+              </a:lnSpc>
+              <a:spcBef>
+                <a:spcPts val="600"/>
+              </a:spcBef>
+              <a:buFont typeface="Calibri" pitchFamily="34" charset="0"/>
+              <a:buChar char="–"/>
+              <a:defRPr/>
+            </a:pPr>
+            <a:r>
+              <a:rPr lang="en-US" sz="2000" kern="1200" dirty="0" smtClean="0">
+                <a:ea typeface="+mn-ea"/>
+              </a:rPr>
+              <a:t>Up to 2 ports 10G and 8 ports 1G</a:t>
+            </a:r>
+          </a:p>
+          <a:p>
+            <a:pPr marL="742950" lvl="1" indent="-285750">
+              <a:lnSpc>
+                <a:spcPct val="90000"/>
+              </a:lnSpc>
+              <a:spcBef>
+                <a:spcPts val="600"/>
+              </a:spcBef>
+              <a:buFont typeface="Calibri" pitchFamily="34" charset="0"/>
+              <a:buChar char="–"/>
+              <a:defRPr/>
+            </a:pPr>
+            <a:r>
+              <a:rPr lang="en-US" sz="2000" kern="1200" dirty="0" smtClean="0">
+                <a:ea typeface="+mn-ea"/>
+              </a:rPr>
+              <a:t>Multiple MDIOs support multiple physical Ethernet interfaces</a:t>
+            </a:r>
+          </a:p>
+          <a:p>
+            <a:pPr marL="285750" lvl="1" indent="-285750">
+              <a:lnSpc>
+                <a:spcPct val="90000"/>
+              </a:lnSpc>
+              <a:spcBef>
+                <a:spcPts val="600"/>
+              </a:spcBef>
+              <a:buFont typeface="Arial" panose="020B0604020202020204" pitchFamily="34" charset="0"/>
+              <a:buChar char="•"/>
+              <a:defRPr/>
+            </a:pPr>
+            <a:r>
+              <a:rPr lang="en-US" sz="2400" kern="1200" dirty="0" smtClean="0">
+                <a:ea typeface="+mn-ea"/>
+              </a:rPr>
+              <a:t>Optimized external data movement:</a:t>
+            </a:r>
+          </a:p>
+          <a:p>
+            <a:pPr marL="742950" lvl="1" indent="-285750">
+              <a:lnSpc>
+                <a:spcPct val="90000"/>
+              </a:lnSpc>
+              <a:spcBef>
+                <a:spcPts val="600"/>
+              </a:spcBef>
+              <a:buFont typeface="Calibri" pitchFamily="34" charset="0"/>
+              <a:buChar char="–"/>
+              <a:defRPr/>
+            </a:pPr>
+            <a:r>
+              <a:rPr lang="en-US" sz="2000" kern="1200" dirty="0" smtClean="0">
+                <a:ea typeface="+mn-ea"/>
+              </a:rPr>
+              <a:t>Standard high-bit rate interfaces: Ethernet and </a:t>
+            </a:r>
+            <a:r>
+              <a:rPr lang="en-US" sz="2000" kern="1200" dirty="0" err="1" smtClean="0">
+                <a:ea typeface="+mn-ea"/>
+              </a:rPr>
+              <a:t>PCIe</a:t>
+            </a:r>
+            <a:r>
+              <a:rPr lang="en-US" sz="2000" kern="1200" dirty="0" smtClean="0">
+                <a:ea typeface="+mn-ea"/>
+              </a:rPr>
+              <a:t> (No SRIO)</a:t>
+            </a:r>
+            <a:endParaRPr lang="en-US" sz="2000" kern="1200" dirty="0" smtClean="0">
+              <a:ea typeface="+mn-ea"/>
+            </a:endParaRPr>
+          </a:p>
+          <a:p>
+            <a:pPr marL="742950" lvl="1" indent="-285750">
+              <a:lnSpc>
+                <a:spcPct val="90000"/>
+              </a:lnSpc>
+              <a:spcBef>
+                <a:spcPts val="600"/>
+              </a:spcBef>
+              <a:buFont typeface="Calibri" pitchFamily="34" charset="0"/>
+              <a:buChar char="–"/>
+              <a:defRPr/>
+            </a:pPr>
+            <a:r>
+              <a:rPr lang="en-US" sz="2000" kern="1200" dirty="0" smtClean="0">
+                <a:ea typeface="+mn-ea"/>
+              </a:rPr>
+              <a:t>EDMA and Multicore Navigator</a:t>
+            </a:r>
+          </a:p>
+          <a:p>
+            <a:pPr marL="285750" lvl="1" indent="-285750">
+              <a:lnSpc>
+                <a:spcPct val="90000"/>
+              </a:lnSpc>
+              <a:spcBef>
+                <a:spcPts val="600"/>
+              </a:spcBef>
+              <a:buFont typeface="Arial" panose="020B0604020202020204" pitchFamily="34" charset="0"/>
+              <a:buChar char="•"/>
+              <a:defRPr/>
+            </a:pPr>
+            <a:r>
+              <a:rPr lang="en-US" sz="2400" kern="1200" dirty="0" smtClean="0">
+                <a:ea typeface="+mn-ea"/>
+              </a:rPr>
+              <a:t>Optimized internal traffic, priorities, arbitrations</a:t>
+            </a:r>
+          </a:p>
+          <a:p>
+            <a:pPr marL="742950" lvl="1" indent="-285750">
+              <a:lnSpc>
+                <a:spcPct val="90000"/>
+              </a:lnSpc>
+              <a:spcBef>
+                <a:spcPts val="600"/>
+              </a:spcBef>
+              <a:buFont typeface="Calibri" pitchFamily="34" charset="0"/>
+              <a:buChar char="–"/>
+              <a:defRPr/>
+            </a:pPr>
+            <a:r>
+              <a:rPr lang="en-US" sz="2000" kern="1200" dirty="0" smtClean="0">
+                <a:ea typeface="+mn-ea"/>
+              </a:rPr>
+              <a:t>TeraNet bus</a:t>
+            </a:r>
+          </a:p>
+          <a:p>
+            <a:pPr marL="742950" lvl="1" indent="-285750">
+              <a:lnSpc>
+                <a:spcPct val="90000"/>
+              </a:lnSpc>
+              <a:spcBef>
+                <a:spcPts val="600"/>
+              </a:spcBef>
+              <a:buFont typeface="Calibri" pitchFamily="34" charset="0"/>
+              <a:buChar char="–"/>
+              <a:defRPr/>
+            </a:pPr>
+            <a:r>
+              <a:rPr lang="en-US" sz="2000" kern="1200" dirty="0" smtClean="0">
+                <a:ea typeface="+mn-ea"/>
+              </a:rPr>
+              <a:t>MSMC</a:t>
+            </a:r>
+          </a:p>
+          <a:p>
+            <a:pPr marL="285750" lvl="1" indent="-285750">
+              <a:lnSpc>
+                <a:spcPct val="90000"/>
+              </a:lnSpc>
+              <a:spcBef>
+                <a:spcPts val="600"/>
+              </a:spcBef>
+              <a:buFont typeface="Arial" panose="020B0604020202020204" pitchFamily="34" charset="0"/>
+              <a:buChar char="•"/>
+              <a:defRPr/>
+            </a:pPr>
+            <a:r>
+              <a:rPr lang="en-US" sz="2400" kern="1200" dirty="0" smtClean="0">
+                <a:ea typeface="+mn-ea"/>
+              </a:rPr>
+              <a:t>Fast (1600 MHz), wide (72 bits), and large (8G) external </a:t>
+            </a:r>
+            <a:r>
+              <a:rPr lang="en-US" sz="2400" kern="1200" dirty="0" smtClean="0">
+                <a:ea typeface="+mn-ea"/>
+              </a:rPr>
+              <a:t>memory; DDRA only</a:t>
+            </a:r>
+            <a:endParaRPr lang="en-US" sz="2400" kern="1200" dirty="0" smtClean="0">
+              <a:ea typeface="+mn-ea"/>
+            </a:endParaRPr>
+          </a:p>
+          <a:p>
+            <a:endParaRPr lang="en-US" dirty="0" smtClean="0"/>
+          </a:p>
+          <a:p>
+            <a:endParaRPr lang="en-US" dirty="0" smtClean="0"/>
+          </a:p>
+        </p:txBody>
+      </p:sp>
+    </p:spTree>
+    <p:extLst>
+      <p:ext uri="{BB962C8B-B14F-4D97-AF65-F5344CB8AC3E}">
+        <p14:creationId xmlns:p14="http://schemas.microsoft.com/office/powerpoint/2010/main" xmlns="" val="300334443"/>
+      </p:ext>
+    </p:extLst>
+  </p:cSld>
+  <p:clrMapOvr>
+    <a:masterClrMapping/>
+  </p:clrMapOvr>
+  <p:timing>
+    <p:tnLst>
+      <p:par>
+        <p:cTn id="1" dur="indefinite" restart="never" nodeType="tmRoot"/>
+      </p:par>
+    </p:tnLst>
+  </p:timing>
+</p:sld>
+</file>
+
+<file path=ppt/slides/slide11.xml><?xml version="1.0" encoding="utf-8"?>
+<p:sld xmlns:a="http://schemas.openxmlformats.org/drawingml/2006/main" xmlns:r="http://schemas.openxmlformats.org/officeDocument/2006/relationships" xmlns:p="http://schemas.openxmlformats.org/presentationml/2006/main">
+  <p:cSld>
+    <p:spTree>
+      <p:nvGrpSpPr>
+        <p:cNvPr id="1" name=""/>
+        <p:cNvGrpSpPr/>
+        <p:nvPr/>
+      </p:nvGrpSpPr>
+      <p:grpSpPr>
+        <a:xfrm>
+          <a:off x="0" y="0"/>
+          <a:ext cx="0" cy="0"/>
+          <a:chOff x="0" y="0"/>
+          <a:chExt cx="0" cy="0"/>
+        </a:xfrm>
+      </p:grpSpPr>
+      <p:sp>
+        <p:nvSpPr>
           <p:cNvPr id="2" name="Title 1"/>
           <p:cNvSpPr>
             <a:spLocks noGrp="1"/>
@@ -6095,7 +6464,7 @@
           <p:nvPr>
             <p:extLst>
               <p:ext uri="{D42A27DB-BD31-4B8C-83A1-F6EECF244321}">
-                <p14:modId xmlns:p14="http://schemas.microsoft.com/office/powerpoint/2010/main" val="2536914482"/>
+                <p14:modId xmlns:p14="http://schemas.microsoft.com/office/powerpoint/2010/main" xmlns="" val="2536914482"/>
               </p:ext>
             </p:extLst>
           </p:nvPr>
@@ -6906,12 +7275,13 @@
                         </a:spcAft>
                       </a:pPr>
                       <a:r>
-                        <a:rPr lang="en-US" sz="1400" dirty="0">
+                        <a:rPr lang="en-US" sz="1400" dirty="0" smtClean="0">
                           <a:effectLst/>
                           <a:latin typeface="Calibri" pitchFamily="34" charset="0"/>
+                          <a:ea typeface="+mn-ea"/>
                           <a:cs typeface="Calibri" pitchFamily="34" charset="0"/>
                         </a:rPr>
-                        <a:t>-</a:t>
+                        <a:t>NA</a:t>
                       </a:r>
                       <a:endParaRPr lang="en-US" sz="1100" dirty="0">
                         <a:effectLst/>
@@ -7721,14 +8091,14 @@
           <a:effectLst/>
           <a:extLst>
             <a:ext uri="{909E8E84-426E-40DD-AFC4-6F175D3DCCD1}">
-              <a14:hiddenFill xmlns:a14="http://schemas.microsoft.com/office/drawing/2010/main">
+              <a14:hiddenFill xmlns:a14="http://schemas.microsoft.com/office/drawing/2010/main" xmlns="">
                 <a:solidFill>
                   <a:schemeClr val="accent1"/>
                 </a:solidFill>
               </a14:hiddenFill>
             </a:ext>
             <a:ext uri="{91240B29-F687-4F45-9708-019B960494DF}">
-              <a14:hiddenLine xmlns:a14="http://schemas.microsoft.com/office/drawing/2010/main" w="9525">
+              <a14:hiddenLine xmlns:a14="http://schemas.microsoft.com/office/drawing/2010/main" xmlns="" w="9525">
                 <a:solidFill>
                   <a:schemeClr val="tx1"/>
                 </a:solidFill>
@@ -7738,7 +8108,7 @@
               </a14:hiddenLine>
             </a:ext>
             <a:ext uri="{AF507438-7753-43E0-B8FC-AC1667EBCBE1}">
-              <a14:hiddenEffects xmlns:a14="http://schemas.microsoft.com/office/drawing/2010/main">
+              <a14:hiddenEffects xmlns:a14="http://schemas.microsoft.com/office/drawing/2010/main" xmlns="">
                 <a:effectLst>
                   <a:outerShdw dist="35921" dir="2700000" algn="ctr" rotWithShape="0">
                     <a:schemeClr val="bg2"/>
@@ -7790,311 +8160,20 @@
     </p:spTree>
     <p:extLst>
       <p:ext uri="{BB962C8B-B14F-4D97-AF65-F5344CB8AC3E}">
-        <p14:creationId xmlns:p14="http://schemas.microsoft.com/office/powerpoint/2010/main" val="3416953927"/>
+        <p14:creationId xmlns:p14="http://schemas.microsoft.com/office/powerpoint/2010/main" xmlns="" val="3416953927"/>
       </p:ext>
     </p:extLst>
   </p:cSld>
   <p:clrMapOvr>
     <a:masterClrMapping/>
   </p:clrMapOvr>
-</p:sld>
-</file>
-
-<file path=ppt/slides/slide11.xml><?xml version="1.0" encoding="utf-8"?>
-<p:sld xmlns:a="http://schemas.openxmlformats.org/drawingml/2006/main" xmlns:r="http://schemas.openxmlformats.org/officeDocument/2006/relationships" xmlns:p="http://schemas.openxmlformats.org/presentationml/2006/main">
-  <p:cSld>
-    <p:spTree>
-      <p:nvGrpSpPr>
-        <p:cNvPr id="1" name=""/>
-        <p:cNvGrpSpPr/>
-        <p:nvPr/>
-      </p:nvGrpSpPr>
-      <p:grpSpPr>
-        <a:xfrm>
-          <a:off x="0" y="0"/>
-          <a:ext cx="0" cy="0"/>
-          <a:chOff x="0" y="0"/>
-          <a:chExt cx="0" cy="0"/>
-        </a:xfrm>
-      </p:grpSpPr>
-      <p:sp>
-        <p:nvSpPr>
-          <p:cNvPr id="4" name="Title 3"/>
-          <p:cNvSpPr>
-            <a:spLocks noGrp="1"/>
-          </p:cNvSpPr>
-          <p:nvPr>
-            <p:ph type="title"/>
-          </p:nvPr>
-        </p:nvSpPr>
-        <p:spPr>
-          <a:xfrm>
-            <a:off x="457200" y="274638"/>
-            <a:ext cx="8229600" cy="715962"/>
-          </a:xfrm>
-        </p:spPr>
-        <p:txBody>
-          <a:bodyPr>
-            <a:normAutofit/>
-          </a:bodyPr>
-          <a:lstStyle/>
-          <a:p>
-            <a:r>
-              <a:rPr lang="en-US" sz="4000" dirty="0" smtClean="0"/>
-              <a:t>K2E Features Summary</a:t>
-            </a:r>
-            <a:endParaRPr lang="en-US" sz="4000" dirty="0"/>
-          </a:p>
-        </p:txBody>
-      </p:sp>
-      <p:sp>
-        <p:nvSpPr>
-          <p:cNvPr id="5" name="Content Placeholder 4"/>
-          <p:cNvSpPr>
-            <a:spLocks noGrp="1"/>
-          </p:cNvSpPr>
-          <p:nvPr>
-            <p:ph idx="1"/>
-          </p:nvPr>
-        </p:nvSpPr>
-        <p:spPr>
-          <a:xfrm>
-            <a:off x="457200" y="990600"/>
-            <a:ext cx="8229600" cy="5638800"/>
-          </a:xfrm>
-        </p:spPr>
-        <p:txBody>
-          <a:bodyPr>
-            <a:normAutofit/>
-          </a:bodyPr>
-          <a:lstStyle/>
-          <a:p>
-            <a:pPr marL="285750" lvl="1" indent="-285750">
-              <a:lnSpc>
-                <a:spcPct val="90000"/>
-              </a:lnSpc>
-              <a:spcBef>
-                <a:spcPts val="600"/>
-              </a:spcBef>
-              <a:buFont typeface="Arial" panose="020B0604020202020204" pitchFamily="34" charset="0"/>
-              <a:buChar char="•"/>
-              <a:defRPr/>
-            </a:pPr>
-            <a:r>
-              <a:rPr lang="en-US" sz="2400" kern="1200" dirty="0" smtClean="0">
-                <a:ea typeface="+mn-ea"/>
-              </a:rPr>
-              <a:t>Powerful Quad-ARM A15CorePac with DSP CorePac support, as needed</a:t>
-            </a:r>
-          </a:p>
-          <a:p>
-            <a:pPr marL="285750" lvl="1" indent="-285750">
-              <a:lnSpc>
-                <a:spcPct val="90000"/>
-              </a:lnSpc>
-              <a:spcBef>
-                <a:spcPts val="600"/>
-              </a:spcBef>
-              <a:buFont typeface="Arial" panose="020B0604020202020204" pitchFamily="34" charset="0"/>
-              <a:buChar char="•"/>
-              <a:defRPr/>
-            </a:pPr>
-            <a:r>
-              <a:rPr lang="en-US" sz="2400" kern="1200" dirty="0" smtClean="0">
-                <a:ea typeface="+mn-ea"/>
-              </a:rPr>
-              <a:t>Robust Ethernet options:</a:t>
-            </a:r>
-          </a:p>
-          <a:p>
-            <a:pPr marL="742950" lvl="1" indent="-285750">
-              <a:lnSpc>
-                <a:spcPct val="90000"/>
-              </a:lnSpc>
-              <a:spcBef>
-                <a:spcPts val="600"/>
-              </a:spcBef>
-              <a:buFont typeface="Calibri" pitchFamily="34" charset="0"/>
-              <a:buChar char="–"/>
-              <a:defRPr/>
-            </a:pPr>
-            <a:r>
-              <a:rPr lang="en-US" sz="2000" kern="1200" dirty="0" smtClean="0">
-                <a:ea typeface="+mn-ea"/>
-              </a:rPr>
-              <a:t>Up to 2 ports 10G and 8 ports 1G</a:t>
-            </a:r>
-          </a:p>
-          <a:p>
-            <a:pPr marL="742950" lvl="1" indent="-285750">
-              <a:lnSpc>
-                <a:spcPct val="90000"/>
-              </a:lnSpc>
-              <a:spcBef>
-                <a:spcPts val="600"/>
-              </a:spcBef>
-              <a:buFont typeface="Calibri" pitchFamily="34" charset="0"/>
-              <a:buChar char="–"/>
-              <a:defRPr/>
-            </a:pPr>
-            <a:r>
-              <a:rPr lang="en-US" sz="2000" kern="1200" dirty="0" smtClean="0">
-                <a:ea typeface="+mn-ea"/>
-              </a:rPr>
-              <a:t>Multiple MDIOs support multiple physical Ethernet interfaces</a:t>
-            </a:r>
-          </a:p>
-          <a:p>
-            <a:pPr marL="285750" lvl="1" indent="-285750">
-              <a:lnSpc>
-                <a:spcPct val="90000"/>
-              </a:lnSpc>
-              <a:spcBef>
-                <a:spcPts val="600"/>
-              </a:spcBef>
-              <a:buFont typeface="Arial" panose="020B0604020202020204" pitchFamily="34" charset="0"/>
-              <a:buChar char="•"/>
-              <a:defRPr/>
-            </a:pPr>
-            <a:r>
-              <a:rPr lang="en-US" sz="2400" kern="1200" dirty="0" smtClean="0">
-                <a:ea typeface="+mn-ea"/>
-              </a:rPr>
-              <a:t>Optimized external data movement:</a:t>
-            </a:r>
-          </a:p>
-          <a:p>
-            <a:pPr marL="742950" lvl="1" indent="-285750">
-              <a:lnSpc>
-                <a:spcPct val="90000"/>
-              </a:lnSpc>
-              <a:spcBef>
-                <a:spcPts val="600"/>
-              </a:spcBef>
-              <a:buFont typeface="Calibri" pitchFamily="34" charset="0"/>
-              <a:buChar char="–"/>
-              <a:defRPr/>
-            </a:pPr>
-            <a:r>
-              <a:rPr lang="en-US" sz="2000" kern="1200" dirty="0" smtClean="0">
-                <a:ea typeface="+mn-ea"/>
-              </a:rPr>
-              <a:t>Standard high-bit rate interfaces: Ethernet and PCIe</a:t>
-            </a:r>
-          </a:p>
-          <a:p>
-            <a:pPr marL="742950" lvl="1" indent="-285750">
-              <a:lnSpc>
-                <a:spcPct val="90000"/>
-              </a:lnSpc>
-              <a:spcBef>
-                <a:spcPts val="600"/>
-              </a:spcBef>
-              <a:buFont typeface="Calibri" pitchFamily="34" charset="0"/>
-              <a:buChar char="–"/>
-              <a:defRPr/>
-            </a:pPr>
-            <a:r>
-              <a:rPr lang="en-US" sz="2000" kern="1200" dirty="0" smtClean="0">
-                <a:ea typeface="+mn-ea"/>
-              </a:rPr>
-              <a:t>EDMA and Multicore Navigator</a:t>
-            </a:r>
-          </a:p>
-          <a:p>
-            <a:pPr marL="285750" lvl="1" indent="-285750">
-              <a:lnSpc>
-                <a:spcPct val="90000"/>
-              </a:lnSpc>
-              <a:spcBef>
-                <a:spcPts val="600"/>
-              </a:spcBef>
-              <a:buFont typeface="Arial" panose="020B0604020202020204" pitchFamily="34" charset="0"/>
-              <a:buChar char="•"/>
-              <a:defRPr/>
-            </a:pPr>
-            <a:r>
-              <a:rPr lang="en-US" sz="2400" kern="1200" dirty="0" smtClean="0">
-                <a:ea typeface="+mn-ea"/>
-              </a:rPr>
-              <a:t>Optimized internal traffic, priorities, arbitrations</a:t>
-            </a:r>
-          </a:p>
-          <a:p>
-            <a:pPr marL="742950" lvl="1" indent="-285750">
-              <a:lnSpc>
-                <a:spcPct val="90000"/>
-              </a:lnSpc>
-              <a:spcBef>
-                <a:spcPts val="600"/>
-              </a:spcBef>
-              <a:buFont typeface="Calibri" pitchFamily="34" charset="0"/>
-              <a:buChar char="–"/>
-              <a:defRPr/>
-            </a:pPr>
-            <a:r>
-              <a:rPr lang="en-US" sz="2000" kern="1200" dirty="0" smtClean="0">
-                <a:ea typeface="+mn-ea"/>
-              </a:rPr>
-              <a:t>TeraNet bus</a:t>
-            </a:r>
-          </a:p>
-          <a:p>
-            <a:pPr marL="742950" lvl="1" indent="-285750">
-              <a:lnSpc>
-                <a:spcPct val="90000"/>
-              </a:lnSpc>
-              <a:spcBef>
-                <a:spcPts val="600"/>
-              </a:spcBef>
-              <a:buFont typeface="Calibri" pitchFamily="34" charset="0"/>
-              <a:buChar char="–"/>
-              <a:defRPr/>
-            </a:pPr>
-            <a:r>
-              <a:rPr lang="en-US" sz="2000" kern="1200" dirty="0" smtClean="0">
-                <a:ea typeface="+mn-ea"/>
-              </a:rPr>
-              <a:t>MSMC</a:t>
-            </a:r>
-          </a:p>
-          <a:p>
-            <a:pPr marL="285750" lvl="1" indent="-285750">
-              <a:lnSpc>
-                <a:spcPct val="90000"/>
-              </a:lnSpc>
-              <a:spcBef>
-                <a:spcPts val="600"/>
-              </a:spcBef>
-              <a:buFont typeface="Arial" panose="020B0604020202020204" pitchFamily="34" charset="0"/>
-              <a:buChar char="•"/>
-              <a:defRPr/>
-            </a:pPr>
-            <a:r>
-              <a:rPr lang="en-US" sz="2400" kern="1200" dirty="0" smtClean="0">
-                <a:ea typeface="+mn-ea"/>
-              </a:rPr>
-              <a:t>Fast (1600 MHz), wide (72 bits), and large (8G) external memory   </a:t>
-            </a:r>
-          </a:p>
-          <a:p>
-            <a:endParaRPr lang="en-US" dirty="0" smtClean="0"/>
-          </a:p>
-          <a:p>
-            <a:endParaRPr lang="en-US" dirty="0" smtClean="0"/>
-          </a:p>
-        </p:txBody>
-      </p:sp>
-    </p:spTree>
-    <p:extLst>
-      <p:ext uri="{BB962C8B-B14F-4D97-AF65-F5344CB8AC3E}">
-        <p14:creationId xmlns:p14="http://schemas.microsoft.com/office/powerpoint/2010/main" val="300334443"/>
-      </p:ext>
-    </p:extLst>
-  </p:cSld>
-  <p:clrMapOvr>
-    <a:masterClrMapping/>
-  </p:clrMapOvr>
+  <p:timing>
+    <p:tnLst>
+      <p:par>
+        <p:cTn id="1" dur="indefinite" restart="never" nodeType="tmRoot"/>
+      </p:par>
+    </p:tnLst>
+  </p:timing>
 </p:sld>
 </file>
 
@@ -8201,7 +8280,31 @@
               <a:rPr lang="en-US" sz="2400" kern="1200" dirty="0" smtClean="0">
                 <a:ea typeface="+mn-ea"/>
               </a:rPr>
-              <a:t>Efficient signal processing calculations, fixed point or floating point or both</a:t>
+              <a:t>Efficient </a:t>
+            </a:r>
+            <a:r>
+              <a:rPr lang="en-US" sz="2400" kern="1200" dirty="0" smtClean="0">
+                <a:ea typeface="+mn-ea"/>
+              </a:rPr>
+              <a:t>signal-processing calculations; Fixed-point </a:t>
+            </a:r>
+            <a:r>
+              <a:rPr lang="en-US" sz="2400" kern="1200" dirty="0" smtClean="0">
+                <a:ea typeface="+mn-ea"/>
+              </a:rPr>
+              <a:t>or </a:t>
+            </a:r>
+            <a:r>
+              <a:rPr lang="en-US" sz="2400" kern="1200" dirty="0" smtClean="0">
+                <a:ea typeface="+mn-ea"/>
+              </a:rPr>
+              <a:t>floating-point </a:t>
+            </a:r>
+            <a:r>
+              <a:rPr lang="en-US" sz="2400" kern="1200" dirty="0" smtClean="0">
+                <a:ea typeface="+mn-ea"/>
+              </a:rPr>
+              <a:t>or both</a:t>
             </a:r>
           </a:p>
           <a:p>
@@ -8220,8 +8323,11 @@
               <a:rPr lang="en-US" sz="2400" kern="1200" dirty="0" smtClean="0">
                 <a:ea typeface="+mn-ea"/>
               </a:rPr>
-              <a:t>Efficient micro-controller applications</a:t>
+              <a:t>Efficient power and performance:</a:t>
             </a:r>
+            <a:endParaRPr lang="en-US" sz="2400" kern="1200" dirty="0" smtClean="0">
+              <a:ea typeface="+mn-ea"/>
+            </a:endParaRPr>
           </a:p>
           <a:p>
             <a:pPr marL="742950" lvl="1" indent="-285750">
@@ -8239,13 +8345,7 @@
               <a:rPr lang="en-US" sz="2000" kern="1200" dirty="0" smtClean="0">
                 <a:ea typeface="+mn-ea"/>
               </a:rPr>
-              <a:t>Within the processor(s</a:t>
-            </a:r>
-            <a:r>
-              <a:rPr lang="en-US" sz="2000" kern="1200" dirty="0" smtClean="0">
-                <a:ea typeface="+mn-ea"/>
-              </a:rPr>
-              <a:t>) (A15)</a:t>
+              <a:t>ARM A15 has high processing-to-power ratio</a:t>
             </a:r>
             <a:endParaRPr lang="en-US" sz="2000" kern="1200" dirty="0" smtClean="0">
               <a:ea typeface="+mn-ea"/>
@@ -8267,17 +8367,38 @@
               <a:rPr lang="en-US" sz="2000" kern="1200" dirty="0" smtClean="0">
                 <a:ea typeface="+mn-ea"/>
               </a:rPr>
-              <a:t>Within the </a:t>
+              <a:t>NET</a:t>
             </a:r>
             <a:r>
               <a:rPr lang="en-US" sz="2000" kern="1200" dirty="0" smtClean="0">
                 <a:ea typeface="+mn-ea"/>
               </a:rPr>
-              <a:t>device (NetCP)</a:t>
+              <a:t>CP</a:t>
             </a:r>
-            <a:endParaRPr lang="en-US" sz="2000" kern="1200" dirty="0" smtClean="0">
-              <a:ea typeface="+mn-ea"/>
-            </a:endParaRPr>
+            <a:r>
+              <a:rPr lang="en-US" sz="2000" kern="1200" dirty="0" smtClean="0">
+                <a:ea typeface="+mn-ea"/>
+              </a:rPr>
+              <a:t> offloads network processing</a:t>
+            </a:r>
+            <a:endParaRPr lang="en-US" sz="2400" kern="1200" dirty="0" smtClean="0"/>
+          </a:p>
+          <a:p>
+            <a:pPr marL="285750" lvl="1" indent="-285750">
+              <a:lnSpc>
+                <a:spcPct val="90000"/>
+              </a:lnSpc>
+              <a:spcBef>
+                <a:spcPts val="600"/>
+              </a:spcBef>
+              <a:buFont typeface="Arial" panose="020B0604020202020204" pitchFamily="34" charset="0"/>
+              <a:buChar char="•"/>
+              <a:defRPr/>
+            </a:pPr>
+            <a:r>
+              <a:rPr lang="en-US" sz="2400" kern="1200" dirty="0" smtClean="0"/>
+              <a:t>Communication and networking interfaces</a:t>
+            </a:r>
           </a:p>
           <a:p>
             <a:pPr marL="742950" lvl="1" indent="-285750">
@@ -8295,17 +8416,39 @@
               <a:rPr lang="en-US" sz="2000" kern="1200" dirty="0" smtClean="0">
                 <a:ea typeface="+mn-ea"/>
               </a:rPr>
-              <a:t>External to the </a:t>
+              <a:t>2x 10G and 8x 1G</a:t>
+            </a:r>
+          </a:p>
+          <a:p>
+            <a:pPr marL="742950" lvl="1" indent="-285750">
+              <a:lnSpc>
+                <a:spcPct val="90000"/>
+              </a:lnSpc>
+              <a:spcBef>
+                <a:spcPts val="600"/>
+              </a:spcBef>
+              <a:buFont typeface="Calibri" pitchFamily="34" charset="0"/>
+              <a:buChar char="–"/>
+              <a:defRPr/>
+            </a:pPr>
+            <a:r>
+              <a:rPr lang="en-US" sz="2000" kern="1200" dirty="0" smtClean="0">
+                <a:ea typeface="+mn-ea"/>
+              </a:rPr>
+              <a:t>2x </a:t>
+            </a:r>
+            <a:r>
+              <a:rPr lang="en-US" sz="2000" kern="1200" dirty="0" err="1" smtClean="0">
+                <a:ea typeface="+mn-ea"/>
+              </a:rPr>
+              <a:t>PCIe</a:t>
             </a:r>
             <a:r>
               <a:rPr lang="en-US" sz="2000" kern="1200" dirty="0" smtClean="0">
                 <a:ea typeface="+mn-ea"/>
               </a:rPr>
-              <a:t>device (10G)</a:t>
+              <a:t> and 3x USB</a:t>
             </a:r>
-            <a:endParaRPr lang="en-US" sz="2000" kern="1200" dirty="0" smtClean="0">
-              <a:ea typeface="+mn-ea"/>
-            </a:endParaRPr>
           </a:p>
           <a:p>
             <a:pPr marL="285750" lvl="1" indent="-285750">
@@ -8315,16 +8458,12 @@
               <a:spcBef>
                 <a:spcPts val="600"/>
               </a:spcBef>
-              <a:buFont typeface="Arial" panose="020B0604020202020204" pitchFamily="34" charset="0"/>
-              <a:buChar char="•"/>
+              <a:buNone/>
               <a:defRPr/>
             </a:pPr>
-            <a:r>
-              <a:rPr lang="en-US" sz="2400" kern="1200" dirty="0" smtClean="0">
-                <a:ea typeface="+mn-ea"/>
-              </a:rPr>
-              <a:t>Power to performance ratio is important</a:t>
-            </a:r>
+            <a:endParaRPr lang="en-US" sz="2400" kern="1200" dirty="0" smtClean="0">
+              <a:ea typeface="+mn-ea"/>
+            </a:endParaRPr>
           </a:p>
           <a:p>
             <a:endParaRPr lang="en-US" dirty="0" smtClean="0"/>
@@ -8340,13 +8479,20 @@
     </p:spTree>
     <p:extLst>
       <p:ext uri="{BB962C8B-B14F-4D97-AF65-F5344CB8AC3E}">
-        <p14:creationId xmlns:p14="http://schemas.microsoft.com/office/powerpoint/2010/main" val="821418795"/>
+        <p14:creationId xmlns:p14="http://schemas.microsoft.com/office/powerpoint/2010/main" xmlns="" val="821418795"/>
       </p:ext>
     </p:extLst>
   </p:cSld>
   <p:clrMapOvr>
     <a:masterClrMapping/>
   </p:clrMapOvr>
+  <p:timing>
+    <p:tnLst>
+      <p:par>
+        <p:cTn id="1" dur="indefinite" restart="never" nodeType="tmRoot"/>
+      </p:par>
+    </p:tnLst>
+  </p:timing>
 </p:sld>
 </file>
 
@@ -8684,7 +8830,7 @@
     </p:custDataLst>
     <p:extLst>
       <p:ext uri="{BB962C8B-B14F-4D97-AF65-F5344CB8AC3E}">
-        <p14:creationId xmlns:p14="http://schemas.microsoft.com/office/powerpoint/2010/main" val="3691244631"/>
+        <p14:creationId xmlns:p14="http://schemas.microsoft.com/office/powerpoint/2010/main" xmlns="" val="3691244631"/>
       </p:ext>
     </p:extLst>
   </p:cSld>
@@ -9162,7 +9308,7 @@
     </p:custDataLst>
     <p:extLst>
       <p:ext uri="{BB962C8B-B14F-4D97-AF65-F5344CB8AC3E}">
-        <p14:creationId xmlns:p14="http://schemas.microsoft.com/office/powerpoint/2010/main" val="856361381"/>
+        <p14:creationId xmlns:p14="http://schemas.microsoft.com/office/powerpoint/2010/main" xmlns="" val="856361381"/>
       </p:ext>
     </p:extLst>
   </p:cSld>
@@ -9249,14 +9395,14 @@
           <a:effectLst/>
           <a:extLst>
             <a:ext uri="{909E8E84-426E-40DD-AFC4-6F175D3DCCD1}">
-              <a14:hiddenFill xmlns:a14="http://schemas.microsoft.com/office/drawing/2010/main">
+              <a14:hiddenFill xmlns:a14="http://schemas.microsoft.com/office/drawing/2010/main" xmlns="">
                 <a:solidFill>
                   <a:schemeClr val="accent1"/>
                 </a:solidFill>
               </a14:hiddenFill>
             </a:ext>
             <a:ext uri="{91240B29-F687-4F45-9708-019B960494DF}">
-              <a14:hiddenLine xmlns:a14="http://schemas.microsoft.com/office/drawing/2010/main" w="9525">
+              <a14:hiddenLine xmlns:a14="http://schemas.microsoft.com/office/drawing/2010/main" xmlns="" w="9525">
                 <a:solidFill>
                   <a:schemeClr val="tx1"/>
                 </a:solidFill>
@@ -9266,7 +9412,7 @@
               </a14:hiddenLine>
             </a:ext>
             <a:ext uri="{AF507438-7753-43E0-B8FC-AC1667EBCBE1}">
-              <a14:hiddenEffects xmlns:a14="http://schemas.microsoft.com/office/drawing/2010/main">
+              <a14:hiddenEffects xmlns:a14="http://schemas.microsoft.com/office/drawing/2010/main" xmlns="">
                 <a:effectLst>
                   <a:outerShdw dist="35921" dir="2700000" algn="ctr" rotWithShape="0">
                     <a:schemeClr val="bg2"/>
@@ -9324,7 +9470,7 @@
           <p:nvPr>
             <p:extLst>
               <p:ext uri="{D42A27DB-BD31-4B8C-83A1-F6EECF244321}">
-                <p14:modId xmlns:p14="http://schemas.microsoft.com/office/powerpoint/2010/main" val="3829498261"/>
+                <p14:modId xmlns:p14="http://schemas.microsoft.com/office/powerpoint/2010/main" xmlns="" val="3829498261"/>
               </p:ext>
             </p:extLst>
           </p:nvPr>
@@ -9335,59 +9481,9 @@
         </p:xfrm>
         <a:graphic>
           <a:graphicData uri="http://schemas.openxmlformats.org/presentationml/2006/ole">
-            <mc:AlternateContent xmlns:mc="http://schemas.openxmlformats.org/markup-compatibility/2006">
-              <mc:Choice xmlns:v="urn:schemas-microsoft-com:vml" Requires="v">
-                <p:oleObj spid="_x0000_s84997" name="Visio" r:id="rId3" imgW="8321715" imgH="6803957" progId="Visio.Drawing.11">
-                  <p:embed/>
-                </p:oleObj>
-              </mc:Choice>
-              <mc:Fallback>
-                <p:oleObj name="Visio" r:id="rId3" imgW="8321715" imgH="6803957" progId="Visio.Drawing.11">
-                  <p:embed/>
-                  <p:pic>
-                    <p:nvPicPr>
-                      <p:cNvPr id="0" name="Picture 2"/>
-                      <p:cNvPicPr>
-                        <a:picLocks noChangeAspect="1" noChangeArrowheads="1"/>
-                      </p:cNvPicPr>
-                      <p:nvPr/>
-                    </p:nvPicPr>
-                    <p:blipFill>
-                      <a:blip r:embed="rId4">
-                        <a:extLst>
-                          <a:ext uri="{28A0092B-C50C-407E-A947-70E740481C1C}">
-                            <a14:useLocalDpi xmlns:a14="http://schemas.microsoft.com/office/drawing/2010/main" val="0"/>
-                          </a:ext>
-                        </a:extLst>
-                      </a:blip>
-                      <a:srcRect/>
-                      <a:stretch>
-                        <a:fillRect/>
-                      </a:stretch>
-                    </p:blipFill>
-                    <p:spPr bwMode="auto">
-                      <a:xfrm>
-                        <a:off x="1141413" y="885825"/>
-                        <a:ext cx="6591300" cy="5384800"/>
-                      </a:xfrm>
-                      <a:prstGeom prst="rect">
-                        <a:avLst/>
-                      </a:prstGeom>
-                      <a:noFill/>
-                      <a:extLst>
-                        <a:ext uri="{909E8E84-426E-40DD-AFC4-6F175D3DCCD1}">
-                          <a14:hiddenFill xmlns:a14="http://schemas.microsoft.com/office/drawing/2010/main">
-                            <a:solidFill>
-                              <a:srgbClr val="FFFFFF"/>
-                            </a:solidFill>
-                          </a14:hiddenFill>
-                        </a:ext>
-                      </a:extLst>
-                    </p:spPr>
-                  </p:pic>
-                </p:oleObj>
-              </mc:Fallback>
-            </mc:AlternateContent>
+            <p:oleObj spid="_x0000_s84997" name="Visio" r:id="rId3" imgW="8321715" imgH="6803957" progId="">
+              <p:embed/>
+            </p:oleObj>
           </a:graphicData>
         </a:graphic>
       </p:graphicFrame>
@@ -9423,13 +9519,20 @@
     </p:spTree>
     <p:extLst>
       <p:ext uri="{BB962C8B-B14F-4D97-AF65-F5344CB8AC3E}">
-        <p14:creationId xmlns:p14="http://schemas.microsoft.com/office/powerpoint/2010/main" val="1580231294"/>
+        <p14:creationId xmlns:p14="http://schemas.microsoft.com/office/powerpoint/2010/main" xmlns="" val="1580231294"/>
       </p:ext>
     </p:extLst>
   </p:cSld>
   <p:clrMapOvr>
     <a:masterClrMapping/>
   </p:clrMapOvr>
+  <p:timing>
+    <p:tnLst>
+      <p:par>
+        <p:cTn id="1" dur="indefinite" restart="never" nodeType="tmRoot"/>
+      </p:par>
+    </p:tnLst>
+  </p:timing>
 </p:sld>
 </file>
 
@@ -9681,7 +9784,7 @@
     </p:custDataLst>
     <p:extLst>
       <p:ext uri="{BB962C8B-B14F-4D97-AF65-F5344CB8AC3E}">
-        <p14:creationId xmlns:p14="http://schemas.microsoft.com/office/powerpoint/2010/main" val="2071910042"/>
+        <p14:creationId xmlns:p14="http://schemas.microsoft.com/office/powerpoint/2010/main" xmlns="" val="2071910042"/>
       </p:ext>
     </p:extLst>
   </p:cSld>
@@ -9920,43 +10023,15 @@
                 <a:latin typeface="Calibri" pitchFamily="34" charset="0"/>
                 <a:cs typeface="Calibri" pitchFamily="34" charset="0"/>
               </a:rPr>
-              <a:t>and </a:t>
+              <a:t>and Fieldbus protocols (IEC 61158</a:t>
             </a:r>
             <a:r>
-              <a:rPr lang="en-US" sz="2400" dirty="0">
+              <a:rPr lang="en-US" sz="2400" dirty="0" smtClean="0">
                 <a:latin typeface="Calibri" pitchFamily="34" charset="0"/>
                 <a:cs typeface="Calibri" pitchFamily="34" charset="0"/>
               </a:rPr>
-              <a:t>Fieldbus protocols </a:t>
+              <a:t>)</a:t>
             </a:r>
-            <a:r>
-              <a:rPr lang="en-US" dirty="0">
-                <a:latin typeface="Calibri" pitchFamily="34" charset="0"/>
-                <a:cs typeface="Calibri" pitchFamily="34" charset="0"/>
-              </a:rPr>
-              <a:t>(</a:t>
-            </a:r>
-            <a:r>
-              <a:rPr lang="en-US" dirty="0"/>
-              <a:t>IEC 61158)</a:t>
-            </a:r>
-            <a:endParaRPr lang="en-US" dirty="0">
-              <a:latin typeface="Calibri" pitchFamily="34" charset="0"/>
-              <a:cs typeface="Calibri" pitchFamily="34" charset="0"/>
-            </a:endParaRPr>
-          </a:p>
-          <a:p>
-            <a:pPr marL="285750" lvl="0" indent="-285750">
-              <a:lnSpc>
-                <a:spcPct val="80000"/>
-              </a:lnSpc>
-              <a:spcBef>
-                <a:spcPts val="600"/>
-              </a:spcBef>
-              <a:buFont typeface="Arial" panose="020B0604020202020204" pitchFamily="34" charset="0"/>
-              <a:buChar char="•"/>
-              <a:defRPr/>
-            </a:pPr>
             <a:endParaRPr lang="en-US" sz="2400" dirty="0" smtClean="0">
               <a:latin typeface="Calibri" pitchFamily="34" charset="0"/>
               <a:cs typeface="Calibri" pitchFamily="34" charset="0"/>
@@ -10064,7 +10139,7 @@
     </p:custDataLst>
     <p:extLst>
       <p:ext uri="{BB962C8B-B14F-4D97-AF65-F5344CB8AC3E}">
-        <p14:creationId xmlns:p14="http://schemas.microsoft.com/office/powerpoint/2010/main" val="3238446912"/>
+        <p14:creationId xmlns:p14="http://schemas.microsoft.com/office/powerpoint/2010/main" xmlns="" val="3238446912"/>
       </p:ext>
     </p:extLst>
   </p:cSld>
@@ -10151,14 +10226,14 @@
           <a:effectLst/>
           <a:extLst>
             <a:ext uri="{909E8E84-426E-40DD-AFC4-6F175D3DCCD1}">
-              <a14:hiddenFill xmlns:a14="http://schemas.microsoft.com/office/drawing/2010/main">
+              <a14:hiddenFill xmlns:a14="http://schemas.microsoft.com/office/drawing/2010/main" xmlns="">
                 <a:solidFill>
                   <a:schemeClr val="accent1"/>
                 </a:solidFill>
               </a14:hiddenFill>
             </a:ext>
             <a:ext uri="{91240B29-F687-4F45-9708-019B960494DF}">
-              <a14:hiddenLine xmlns:a14="http://schemas.microsoft.com/office/drawing/2010/main" w="9525">
+              <a14:hiddenLine xmlns:a14="http://schemas.microsoft.com/office/drawing/2010/main" xmlns="" w="9525">
                 <a:solidFill>
                   <a:schemeClr val="tx1"/>
                 </a:solidFill>
@@ -10168,7 +10243,7 @@
               </a14:hiddenLine>
             </a:ext>
             <a:ext uri="{AF507438-7753-43E0-B8FC-AC1667EBCBE1}">
-              <a14:hiddenEffects xmlns:a14="http://schemas.microsoft.com/office/drawing/2010/main">
+              <a14:hiddenEffects xmlns:a14="http://schemas.microsoft.com/office/drawing/2010/main" xmlns="">
                 <a:effectLst>
                   <a:outerShdw dist="35921" dir="2700000" algn="ctr" rotWithShape="0">
                     <a:schemeClr val="bg2"/>
@@ -10226,7 +10301,7 @@
           <p:nvPr>
             <p:extLst>
               <p:ext uri="{D42A27DB-BD31-4B8C-83A1-F6EECF244321}">
-                <p14:modId xmlns:p14="http://schemas.microsoft.com/office/powerpoint/2010/main" val="601772777"/>
+                <p14:modId xmlns:p14="http://schemas.microsoft.com/office/powerpoint/2010/main" xmlns="" val="601772777"/>
               </p:ext>
             </p:extLst>
           </p:nvPr>
@@ -10237,59 +10312,9 @@
         </p:xfrm>
         <a:graphic>
           <a:graphicData uri="http://schemas.openxmlformats.org/presentationml/2006/ole">
-            <mc:AlternateContent xmlns:mc="http://schemas.openxmlformats.org/markup-compatibility/2006">
-              <mc:Choice xmlns:v="urn:schemas-microsoft-com:vml" Requires="v">
-                <p:oleObj spid="_x0000_s86021" name="Visio" r:id="rId3" imgW="8321715" imgH="6803957" progId="Visio.Drawing.11">
-                  <p:embed/>
-                </p:oleObj>
-              </mc:Choice>
-              <mc:Fallback>
-                <p:oleObj name="Visio" r:id="rId3" imgW="8321715" imgH="6803957" progId="Visio.Drawing.11">
-                  <p:embed/>
-                  <p:pic>
-                    <p:nvPicPr>
-                      <p:cNvPr id="0" name="Picture 2"/>
-                      <p:cNvPicPr>
-                        <a:picLocks noChangeAspect="1" noChangeArrowheads="1"/>
-                      </p:cNvPicPr>
-                      <p:nvPr/>
-                    </p:nvPicPr>
-                    <p:blipFill>
-                      <a:blip r:embed="rId4">
-                        <a:extLst>
-                          <a:ext uri="{28A0092B-C50C-407E-A947-70E740481C1C}">
-                            <a14:useLocalDpi xmlns:a14="http://schemas.microsoft.com/office/drawing/2010/main" val="0"/>
-                          </a:ext>
-                        </a:extLst>
-                      </a:blip>
-                      <a:srcRect/>
-                      <a:stretch>
-                        <a:fillRect/>
-                      </a:stretch>
-                    </p:blipFill>
-                    <p:spPr bwMode="auto">
-                      <a:xfrm>
-                        <a:off x="1141413" y="885825"/>
-                        <a:ext cx="6591300" cy="5384800"/>
-                      </a:xfrm>
-                      <a:prstGeom prst="rect">
-                        <a:avLst/>
-                      </a:prstGeom>
-                      <a:noFill/>
-                      <a:extLst>
-                        <a:ext uri="{909E8E84-426E-40DD-AFC4-6F175D3DCCD1}">
-                          <a14:hiddenFill xmlns:a14="http://schemas.microsoft.com/office/drawing/2010/main">
-                            <a:solidFill>
-                              <a:srgbClr val="FFFFFF"/>
-                            </a:solidFill>
-                          </a14:hiddenFill>
-                        </a:ext>
-                      </a:extLst>
-                    </p:spPr>
-                  </p:pic>
-                </p:oleObj>
-              </mc:Fallback>
-            </mc:AlternateContent>
+            <p:oleObj spid="_x0000_s86021" name="Visio" r:id="rId3" imgW="8321715" imgH="6803957" progId="">
+              <p:embed/>
+            </p:oleObj>
           </a:graphicData>
         </a:graphic>
       </p:graphicFrame>
@@ -10325,13 +10350,20 @@
     </p:spTree>
     <p:extLst>
       <p:ext uri="{BB962C8B-B14F-4D97-AF65-F5344CB8AC3E}">
-        <p14:creationId xmlns:p14="http://schemas.microsoft.com/office/powerpoint/2010/main" val="1958137510"/>
+        <p14:creationId xmlns:p14="http://schemas.microsoft.com/office/powerpoint/2010/main" xmlns="" val="1958137510"/>
       </p:ext>
     </p:extLst>
   </p:cSld>
   <p:clrMapOvr>
     <a:masterClrMapping/>
   </p:clrMapOvr>
+  <p:timing>
+    <p:tnLst>
+      <p:par>
+        <p:cTn id="1" dur="indefinite" restart="never" nodeType="tmRoot"/>
+      </p:par>
+    </p:tnLst>
+  </p:timing>
 </p:sld>
 </file>
 
@@ -10424,8 +10456,47 @@
                 <a:latin typeface="Calibri" pitchFamily="34" charset="0"/>
                 <a:cs typeface="Calibri" pitchFamily="34" charset="0"/>
               </a:rPr>
-              <a:t>ARM-only TI multicore device</a:t>
+              <a:t>ARM-only TI </a:t>
             </a:r>
+            <a:r>
+              <a:rPr lang="en-US" sz="2400" dirty="0" err="1" smtClean="0">
+                <a:latin typeface="Calibri" pitchFamily="34" charset="0"/>
+                <a:cs typeface="Calibri" pitchFamily="34" charset="0"/>
+              </a:rPr>
+              <a:t>multicore</a:t>
+            </a:r>
+            <a:r>
+              <a:rPr lang="en-US" sz="2400" dirty="0" smtClean="0">
+                <a:latin typeface="Calibri" pitchFamily="34" charset="0"/>
+                <a:cs typeface="Calibri" pitchFamily="34" charset="0"/>
+              </a:rPr>
+              <a:t> </a:t>
+            </a:r>
+            <a:r>
+              <a:rPr lang="en-US" sz="2400" dirty="0" smtClean="0">
+                <a:latin typeface="Calibri" pitchFamily="34" charset="0"/>
+                <a:cs typeface="Calibri" pitchFamily="34" charset="0"/>
+              </a:rPr>
+              <a:t>device (First in the </a:t>
+            </a:r>
+            <a:r>
+              <a:rPr lang="en-US" sz="2400" dirty="0" err="1" smtClean="0">
+                <a:latin typeface="Calibri" pitchFamily="34" charset="0"/>
+                <a:cs typeface="Calibri" pitchFamily="34" charset="0"/>
+              </a:rPr>
+              <a:t>KeyStone</a:t>
+            </a:r>
+            <a:r>
+              <a:rPr lang="en-US" sz="2400" dirty="0" smtClean="0">
+                <a:latin typeface="Calibri" pitchFamily="34" charset="0"/>
+                <a:cs typeface="Calibri" pitchFamily="34" charset="0"/>
+              </a:rPr>
+              <a:t> architecture)</a:t>
+            </a:r>
+            <a:endParaRPr lang="en-US" sz="2400" dirty="0" smtClean="0">
+              <a:latin typeface="Calibri" pitchFamily="34" charset="0"/>
+              <a:cs typeface="Calibri" pitchFamily="34" charset="0"/>
+            </a:endParaRPr>
           </a:p>
           <a:p>
             <a:pPr marL="285750" lvl="1" indent="-285750">
@@ -10628,7 +10699,7 @@
     </p:custDataLst>
     <p:extLst>
       <p:ext uri="{BB962C8B-B14F-4D97-AF65-F5344CB8AC3E}">
-        <p14:creationId xmlns:p14="http://schemas.microsoft.com/office/powerpoint/2010/main" val="873099895"/>
+        <p14:creationId xmlns:p14="http://schemas.microsoft.com/office/powerpoint/2010/main" xmlns="" val="873099895"/>
       </p:ext>
     </p:extLst>
   </p:cSld>
@@ -10724,8 +10795,13 @@
           <a:p>
             <a:r>
               <a:rPr lang="en-US" sz="2800" dirty="0" smtClean="0"/>
-              <a:t>K2E Device Summary</a:t>
+              <a:t>K2E </a:t>
             </a:r>
+            <a:r>
+              <a:rPr lang="en-US" sz="2800" dirty="0" smtClean="0"/>
+              <a:t>Software</a:t>
+            </a:r>
+            <a:endParaRPr lang="en-US" sz="2800" dirty="0" smtClean="0"/>
           </a:p>
           <a:p>
             <a:r>
@@ -10971,27 +11047,22 @@
                 <a:latin typeface="Calibri" pitchFamily="34" charset="0"/>
                 <a:cs typeface="Calibri" pitchFamily="34" charset="0"/>
               </a:rPr>
-              <a:t>Fieldbus protocols </a:t>
+              <a:t>Fieldbus protocols (</a:t>
             </a:r>
             <a:r>
-              <a:rPr lang="en-US" dirty="0" smtClean="0">
+              <a:rPr lang="en-US" sz="2400" dirty="0">
                 <a:latin typeface="Calibri" pitchFamily="34" charset="0"/>
                 <a:cs typeface="Calibri" pitchFamily="34" charset="0"/>
               </a:rPr>
-              <a:t>(</a:t>
-            </a:r>
-            <a:r>
-              <a:rPr lang="en-US" dirty="0"/>
               <a:t>IEC </a:t>
             </a:r>
             <a:r>
-              <a:rPr lang="en-US" dirty="0" smtClean="0"/>
+              <a:rPr lang="en-US" sz="2400" dirty="0" smtClean="0">
+                <a:latin typeface="Calibri" pitchFamily="34" charset="0"/>
+                <a:cs typeface="Calibri" pitchFamily="34" charset="0"/>
+              </a:rPr>
               <a:t>61158)</a:t>
             </a:r>
-            <a:endParaRPr lang="en-US" dirty="0" smtClean="0">
-              <a:latin typeface="Calibri" pitchFamily="34" charset="0"/>
-              <a:cs typeface="Calibri" pitchFamily="34" charset="0"/>
-            </a:endParaRPr>
           </a:p>
           <a:p>
             <a:pPr marL="285750" indent="-285750">
@@ -11107,7 +11178,7 @@
     </p:custDataLst>
     <p:extLst>
       <p:ext uri="{BB962C8B-B14F-4D97-AF65-F5344CB8AC3E}">
-        <p14:creationId xmlns:p14="http://schemas.microsoft.com/office/powerpoint/2010/main" val="3461455567"/>
+        <p14:creationId xmlns:p14="http://schemas.microsoft.com/office/powerpoint/2010/main" xmlns="" val="3461455567"/>
       </p:ext>
     </p:extLst>
   </p:cSld>
@@ -11253,7 +11324,14 @@
                 <a:latin typeface="Calibri" pitchFamily="34" charset="0"/>
                 <a:cs typeface="Calibri" pitchFamily="34" charset="0"/>
               </a:rPr>
-              <a:t>High performance processing</a:t>
+              <a:t>High-performance </a:t>
+            </a:r>
+            <a:r>
+              <a:rPr lang="en-US" sz="2000" dirty="0" smtClean="0">
+                <a:latin typeface="Calibri" pitchFamily="34" charset="0"/>
+                <a:cs typeface="Calibri" pitchFamily="34" charset="0"/>
+              </a:rPr>
+              <a:t>processing</a:t>
             </a:r>
           </a:p>
           <a:p>
@@ -11353,26 +11431,6 @@
                 <a:latin typeface="Calibri" pitchFamily="34" charset="0"/>
                 <a:cs typeface="Calibri" pitchFamily="34" charset="0"/>
               </a:rPr>
-              <a:t>Efficient memory and internal bus utilization (MSMC, TeraNet)  </a:t>
-            </a:r>
-          </a:p>
-          <a:p>
-            <a:pPr marL="742950" lvl="1" indent="-285750">
-              <a:lnSpc>
-                <a:spcPct val="80000"/>
-              </a:lnSpc>
-              <a:spcBef>
-                <a:spcPts val="600"/>
-              </a:spcBef>
-              <a:buFont typeface="Calibri" pitchFamily="34" charset="0"/>
-              <a:buChar char="–"/>
-              <a:defRPr/>
-            </a:pPr>
-            <a:r>
-              <a:rPr lang="en-US" sz="2000" dirty="0" smtClean="0">
-                <a:latin typeface="Calibri" pitchFamily="34" charset="0"/>
-                <a:cs typeface="Calibri" pitchFamily="34" charset="0"/>
-              </a:rPr>
               <a:t>Open-source applications available</a:t>
             </a:r>
           </a:p>
@@ -11393,7 +11451,41 @@
                 <a:latin typeface="Calibri" pitchFamily="34" charset="0"/>
                 <a:cs typeface="Calibri" pitchFamily="34" charset="0"/>
               </a:rPr>
-              <a:t>Support for big </a:t>
+              <a:t>Efficient </a:t>
+            </a:r>
+            <a:r>
+              <a:rPr lang="en-US" sz="2000" dirty="0" smtClean="0">
+                <a:latin typeface="Calibri" pitchFamily="34" charset="0"/>
+                <a:cs typeface="Calibri" pitchFamily="34" charset="0"/>
+              </a:rPr>
+              <a:t>memory and internal bus utilization (MSMC, TeraNet)  </a:t>
+            </a:r>
+          </a:p>
+          <a:p>
+            <a:pPr marL="742950" lvl="1" indent="-285750">
+              <a:lnSpc>
+                <a:spcPct val="80000"/>
+              </a:lnSpc>
+              <a:spcBef>
+                <a:spcPts val="600"/>
+              </a:spcBef>
+              <a:buFont typeface="Calibri" pitchFamily="34" charset="0"/>
+              <a:buChar char="–"/>
+              <a:defRPr/>
+            </a:pPr>
+            <a:r>
+              <a:rPr lang="en-US" sz="2000" dirty="0" smtClean="0">
+                <a:latin typeface="Calibri" pitchFamily="34" charset="0"/>
+                <a:cs typeface="Calibri" pitchFamily="34" charset="0"/>
+              </a:rPr>
+              <a:t>Support </a:t>
+            </a:r>
+            <a:r>
+              <a:rPr lang="en-US" sz="2000" dirty="0" smtClean="0">
+                <a:latin typeface="Calibri" pitchFamily="34" charset="0"/>
+                <a:cs typeface="Calibri" pitchFamily="34" charset="0"/>
+              </a:rPr>
+              <a:t>for big </a:t>
             </a:r>
             <a:r>
               <a:rPr lang="en-US" sz="2000" dirty="0">
@@ -11409,10 +11501,6 @@
               </a:rPr>
               <a:t>ndian</a:t>
             </a:r>
-            <a:endParaRPr lang="en-US" sz="2000" dirty="0" smtClean="0">
-              <a:latin typeface="Calibri" pitchFamily="34" charset="0"/>
-              <a:cs typeface="Calibri" pitchFamily="34" charset="0"/>
-            </a:endParaRPr>
           </a:p>
         </p:txBody>
       </p:sp>
@@ -11478,7 +11566,7 @@
     </p:custDataLst>
     <p:extLst>
       <p:ext uri="{BB962C8B-B14F-4D97-AF65-F5344CB8AC3E}">
-        <p14:creationId xmlns:p14="http://schemas.microsoft.com/office/powerpoint/2010/main" val="3461455567"/>
+        <p14:creationId xmlns:p14="http://schemas.microsoft.com/office/powerpoint/2010/main" xmlns="" val="3461455567"/>
       </p:ext>
     </p:extLst>
   </p:cSld>
@@ -11565,14 +11653,14 @@
           <a:effectLst/>
           <a:extLst>
             <a:ext uri="{909E8E84-426E-40DD-AFC4-6F175D3DCCD1}">
-              <a14:hiddenFill xmlns:a14="http://schemas.microsoft.com/office/drawing/2010/main">
+              <a14:hiddenFill xmlns:a14="http://schemas.microsoft.com/office/drawing/2010/main" xmlns="">
                 <a:solidFill>
                   <a:schemeClr val="accent1"/>
                 </a:solidFill>
               </a14:hiddenFill>
             </a:ext>
             <a:ext uri="{91240B29-F687-4F45-9708-019B960494DF}">
-              <a14:hiddenLine xmlns:a14="http://schemas.microsoft.com/office/drawing/2010/main" w="9525">
+              <a14:hiddenLine xmlns:a14="http://schemas.microsoft.com/office/drawing/2010/main" xmlns="" w="9525">
                 <a:solidFill>
                   <a:schemeClr val="tx1"/>
                 </a:solidFill>
@@ -11582,7 +11670,7 @@
               </a14:hiddenLine>
             </a:ext>
             <a:ext uri="{AF507438-7753-43E0-B8FC-AC1667EBCBE1}">
-              <a14:hiddenEffects xmlns:a14="http://schemas.microsoft.com/office/drawing/2010/main">
+              <a14:hiddenEffects xmlns:a14="http://schemas.microsoft.com/office/drawing/2010/main" xmlns="">
                 <a:effectLst>
                   <a:outerShdw dist="35921" dir="2700000" algn="ctr" rotWithShape="0">
                     <a:schemeClr val="bg2"/>
@@ -11640,7 +11728,7 @@
           <p:nvPr>
             <p:extLst>
               <p:ext uri="{D42A27DB-BD31-4B8C-83A1-F6EECF244321}">
-                <p14:modId xmlns:p14="http://schemas.microsoft.com/office/powerpoint/2010/main" val="1983457263"/>
+                <p14:modId xmlns:p14="http://schemas.microsoft.com/office/powerpoint/2010/main" xmlns="" val="1983457263"/>
               </p:ext>
             </p:extLst>
           </p:nvPr>
@@ -11651,72 +11739,29 @@
         </p:xfrm>
         <a:graphic>
           <a:graphicData uri="http://schemas.openxmlformats.org/presentationml/2006/ole">
-            <mc:AlternateContent xmlns:mc="http://schemas.openxmlformats.org/markup-compatibility/2006">
-              <mc:Choice xmlns:v="urn:schemas-microsoft-com:vml" Requires="v">
-                <p:oleObj spid="_x0000_s87045" name="Visio" r:id="rId3" imgW="8321715" imgH="6803957" progId="Visio.Drawing.11">
-                  <p:embed/>
-                </p:oleObj>
-              </mc:Choice>
-              <mc:Fallback>
-                <p:oleObj name="Visio" r:id="rId3" imgW="8321715" imgH="6803957" progId="Visio.Drawing.11">
-                  <p:embed/>
-                  <p:pic>
-                    <p:nvPicPr>
-                      <p:cNvPr id="0" name="Picture 2"/>
-                      <p:cNvPicPr>
-                        <a:picLocks noChangeAspect="1" noChangeArrowheads="1"/>
-                      </p:cNvPicPr>
-                      <p:nvPr/>
-                    </p:nvPicPr>
-                    <p:blipFill>
-                      <a:blip r:embed="rId4">
-                        <a:extLst>
-                          <a:ext uri="{28A0092B-C50C-407E-A947-70E740481C1C}">
-                            <a14:useLocalDpi xmlns:a14="http://schemas.microsoft.com/office/drawing/2010/main" val="0"/>
-                          </a:ext>
-                        </a:extLst>
-                      </a:blip>
-                      <a:srcRect/>
-                      <a:stretch>
-                        <a:fillRect/>
-                      </a:stretch>
-                    </p:blipFill>
-                    <p:spPr bwMode="auto">
-                      <a:xfrm>
-                        <a:off x="1143000" y="885825"/>
-                        <a:ext cx="6591300" cy="5384800"/>
-                      </a:xfrm>
-                      <a:prstGeom prst="rect">
-                        <a:avLst/>
-                      </a:prstGeom>
-                      <a:noFill/>
-                      <a:extLst>
-                        <a:ext uri="{909E8E84-426E-40DD-AFC4-6F175D3DCCD1}">
-                          <a14:hiddenFill xmlns:a14="http://schemas.microsoft.com/office/drawing/2010/main">
-                            <a:solidFill>
-                              <a:srgbClr val="FFFFFF"/>
-                            </a:solidFill>
-                          </a14:hiddenFill>
-                        </a:ext>
-                      </a:extLst>
-                    </p:spPr>
-                  </p:pic>
-                </p:oleObj>
-              </mc:Fallback>
-            </mc:AlternateContent>
+            <p:oleObj spid="_x0000_s87045" name="Visio" r:id="rId3" imgW="8321715" imgH="6803957" progId="">
+              <p:embed/>
+            </p:oleObj>
           </a:graphicData>
         </a:graphic>
       </p:graphicFrame>
     </p:spTree>
     <p:extLst>
       <p:ext uri="{BB962C8B-B14F-4D97-AF65-F5344CB8AC3E}">
-        <p14:creationId xmlns:p14="http://schemas.microsoft.com/office/powerpoint/2010/main" val="3802289127"/>
+        <p14:creationId xmlns:p14="http://schemas.microsoft.com/office/powerpoint/2010/main" xmlns="" val="3802289127"/>
       </p:ext>
     </p:extLst>
   </p:cSld>
   <p:clrMapOvr>
     <a:masterClrMapping/>
   </p:clrMapOvr>
+  <p:timing>
+    <p:tnLst>
+      <p:par>
+        <p:cTn id="1" dur="indefinite" restart="never" nodeType="tmRoot"/>
+      </p:par>
+    </p:tnLst>
+  </p:timing>
 </p:sld>
 </file>
 
@@ -11993,7 +12038,7 @@
     </p:custDataLst>
     <p:extLst>
       <p:ext uri="{BB962C8B-B14F-4D97-AF65-F5344CB8AC3E}">
-        <p14:creationId xmlns:p14="http://schemas.microsoft.com/office/powerpoint/2010/main" val="2835436665"/>
+        <p14:creationId xmlns:p14="http://schemas.microsoft.com/office/powerpoint/2010/main" xmlns="" val="2835436665"/>
       </p:ext>
     </p:extLst>
   </p:cSld>
@@ -12080,14 +12125,14 @@
           <a:effectLst/>
           <a:extLst>
             <a:ext uri="{909E8E84-426E-40DD-AFC4-6F175D3DCCD1}">
-              <a14:hiddenFill xmlns:a14="http://schemas.microsoft.com/office/drawing/2010/main">
+              <a14:hiddenFill xmlns:a14="http://schemas.microsoft.com/office/drawing/2010/main" xmlns="">
                 <a:solidFill>
                   <a:schemeClr val="accent1"/>
                 </a:solidFill>
               </a14:hiddenFill>
             </a:ext>
             <a:ext uri="{91240B29-F687-4F45-9708-019B960494DF}">
-              <a14:hiddenLine xmlns:a14="http://schemas.microsoft.com/office/drawing/2010/main" w="9525">
+              <a14:hiddenLine xmlns:a14="http://schemas.microsoft.com/office/drawing/2010/main" xmlns="" w="9525">
                 <a:solidFill>
                   <a:schemeClr val="tx1"/>
                 </a:solidFill>
@@ -12097,7 +12142,7 @@
               </a14:hiddenLine>
             </a:ext>
             <a:ext uri="{AF507438-7753-43E0-B8FC-AC1667EBCBE1}">
-              <a14:hiddenEffects xmlns:a14="http://schemas.microsoft.com/office/drawing/2010/main">
+              <a14:hiddenEffects xmlns:a14="http://schemas.microsoft.com/office/drawing/2010/main" xmlns="">
                 <a:effectLst>
                   <a:outerShdw dist="35921" dir="2700000" algn="ctr" rotWithShape="0">
                     <a:schemeClr val="bg2"/>
@@ -12155,7 +12200,7 @@
           <p:nvPr>
             <p:extLst>
               <p:ext uri="{D42A27DB-BD31-4B8C-83A1-F6EECF244321}">
-                <p14:modId xmlns:p14="http://schemas.microsoft.com/office/powerpoint/2010/main" val="2083442245"/>
+                <p14:modId xmlns:p14="http://schemas.microsoft.com/office/powerpoint/2010/main" xmlns="" val="2083442245"/>
               </p:ext>
             </p:extLst>
           </p:nvPr>
@@ -12166,72 +12211,29 @@
         </p:xfrm>
         <a:graphic>
           <a:graphicData uri="http://schemas.openxmlformats.org/presentationml/2006/ole">
-            <mc:AlternateContent xmlns:mc="http://schemas.openxmlformats.org/markup-compatibility/2006">
-              <mc:Choice xmlns:v="urn:schemas-microsoft-com:vml" Requires="v">
-                <p:oleObj spid="_x0000_s88069" name="Visio" r:id="rId3" imgW="8321715" imgH="6803957" progId="Visio.Drawing.11">
-                  <p:embed/>
-                </p:oleObj>
-              </mc:Choice>
-              <mc:Fallback>
-                <p:oleObj name="Visio" r:id="rId3" imgW="8321715" imgH="6803957" progId="Visio.Drawing.11">
-                  <p:embed/>
-                  <p:pic>
-                    <p:nvPicPr>
-                      <p:cNvPr id="0" name="Picture 2"/>
-                      <p:cNvPicPr>
-                        <a:picLocks noChangeAspect="1" noChangeArrowheads="1"/>
-                      </p:cNvPicPr>
-                      <p:nvPr/>
-                    </p:nvPicPr>
-                    <p:blipFill>
-                      <a:blip r:embed="rId4">
-                        <a:extLst>
-                          <a:ext uri="{28A0092B-C50C-407E-A947-70E740481C1C}">
-                            <a14:useLocalDpi xmlns:a14="http://schemas.microsoft.com/office/drawing/2010/main" val="0"/>
-                          </a:ext>
-                        </a:extLst>
-                      </a:blip>
-                      <a:srcRect/>
-                      <a:stretch>
-                        <a:fillRect/>
-                      </a:stretch>
-                    </p:blipFill>
-                    <p:spPr bwMode="auto">
-                      <a:xfrm>
-                        <a:off x="1143000" y="885825"/>
-                        <a:ext cx="6591300" cy="5387975"/>
-                      </a:xfrm>
-                      <a:prstGeom prst="rect">
-                        <a:avLst/>
-                      </a:prstGeom>
-                      <a:noFill/>
-                      <a:extLst>
-                        <a:ext uri="{909E8E84-426E-40DD-AFC4-6F175D3DCCD1}">
-                          <a14:hiddenFill xmlns:a14="http://schemas.microsoft.com/office/drawing/2010/main">
-                            <a:solidFill>
-                              <a:srgbClr val="FFFFFF"/>
-                            </a:solidFill>
-                          </a14:hiddenFill>
-                        </a:ext>
-                      </a:extLst>
-                    </p:spPr>
-                  </p:pic>
-                </p:oleObj>
-              </mc:Fallback>
-            </mc:AlternateContent>
+            <p:oleObj spid="_x0000_s88069" name="Visio" r:id="rId3" imgW="8321715" imgH="6803957" progId="">
+              <p:embed/>
+            </p:oleObj>
           </a:graphicData>
         </a:graphic>
       </p:graphicFrame>
     </p:spTree>
     <p:extLst>
       <p:ext uri="{BB962C8B-B14F-4D97-AF65-F5344CB8AC3E}">
-        <p14:creationId xmlns:p14="http://schemas.microsoft.com/office/powerpoint/2010/main" val="3874421043"/>
+        <p14:creationId xmlns:p14="http://schemas.microsoft.com/office/powerpoint/2010/main" xmlns="" val="3874421043"/>
       </p:ext>
     </p:extLst>
   </p:cSld>
   <p:clrMapOvr>
     <a:masterClrMapping/>
   </p:clrMapOvr>
+  <p:timing>
+    <p:tnLst>
+      <p:par>
+        <p:cTn id="1" dur="indefinite" restart="never" nodeType="tmRoot"/>
+      </p:par>
+    </p:tnLst>
+  </p:timing>
 </p:sld>
 </file>
 
@@ -12270,7 +12272,11 @@
             <a:pPr algn="l"/>
             <a:r>
               <a:rPr lang="en-US" dirty="0" smtClean="0"/>
-              <a:t>K2E Device Summary</a:t>
+              <a:t>K2E </a:t>
+            </a:r>
+            <a:r>
+              <a:rPr lang="en-US" dirty="0" smtClean="0"/>
+              <a:t>Software</a:t>
             </a:r>
             <a:endParaRPr lang="en-US" dirty="0"/>
           </a:p>
@@ -12621,7 +12627,19 @@
               <a:rPr lang="en-US" sz="2400" kern="1200" dirty="0" smtClean="0">
                 <a:ea typeface="+mn-ea"/>
               </a:rPr>
-              <a:t>Automatic setting of DEVM frequency based on the chip EFUSE value instead of environment variable in </a:t>
+              <a:t>Automatic setting of </a:t>
+            </a:r>
+            <a:r>
+              <a:rPr lang="en-US" sz="2400" kern="1200" dirty="0" smtClean="0">
+                <a:ea typeface="+mn-ea"/>
+              </a:rPr>
+              <a:t>EVM </a:t>
+            </a:r>
+            <a:r>
+              <a:rPr lang="en-US" sz="2400" kern="1200" dirty="0" smtClean="0">
+                <a:ea typeface="+mn-ea"/>
+              </a:rPr>
+              <a:t>frequency based on the chip EFUSE value instead of environment variable in </a:t>
             </a:r>
             <a:r>
               <a:rPr lang="en-US" sz="2400" kern="1200" dirty="0" err="1" smtClean="0">
@@ -12638,13 +12656,20 @@
     </p:spTree>
     <p:extLst>
       <p:ext uri="{BB962C8B-B14F-4D97-AF65-F5344CB8AC3E}">
-        <p14:creationId xmlns:p14="http://schemas.microsoft.com/office/powerpoint/2010/main" val="2660321590"/>
+        <p14:creationId xmlns:p14="http://schemas.microsoft.com/office/powerpoint/2010/main" xmlns="" val="2660321590"/>
       </p:ext>
     </p:extLst>
   </p:cSld>
   <p:clrMapOvr>
     <a:masterClrMapping/>
   </p:clrMapOvr>
+  <p:timing>
+    <p:tnLst>
+      <p:par>
+        <p:cTn id="1" dur="indefinite" restart="never" nodeType="tmRoot"/>
+      </p:par>
+    </p:tnLst>
+  </p:timing>
 </p:sld>
 </file>
 
@@ -12941,6 +12966,13 @@
   <p:clrMapOvr>
     <a:masterClrMapping/>
   </p:clrMapOvr>
+  <p:timing>
+    <p:tnLst>
+      <p:par>
+        <p:cTn id="1" dur="indefinite" restart="never" nodeType="tmRoot"/>
+      </p:par>
+    </p:tnLst>
+  </p:timing>
 </p:sld>
 </file>
 
@@ -13121,7 +13153,14 @@
                 <a:latin typeface="Calibri" pitchFamily="34" charset="0"/>
                 <a:cs typeface="Calibri" pitchFamily="34" charset="0"/>
               </a:rPr>
-              <a:t>High performance ARM + DSP</a:t>
+              <a:t>High-performance </a:t>
+            </a:r>
+            <a:r>
+              <a:rPr lang="en-US" dirty="0" smtClean="0">
+                <a:latin typeface="Calibri" pitchFamily="34" charset="0"/>
+                <a:cs typeface="Calibri" pitchFamily="34" charset="0"/>
+              </a:rPr>
+              <a:t>ARM + DSP</a:t>
             </a:r>
           </a:p>
           <a:p>
@@ -13134,8 +13173,19 @@
                 <a:latin typeface="Calibri" pitchFamily="34" charset="0"/>
                 <a:cs typeface="Calibri" pitchFamily="34" charset="0"/>
               </a:rPr>
-              <a:t>Memory Subsystem</a:t>
+              <a:t>Memory </a:t>
             </a:r>
+            <a:r>
+              <a:rPr lang="en-US" dirty="0" smtClean="0">
+                <a:latin typeface="Calibri" pitchFamily="34" charset="0"/>
+                <a:cs typeface="Calibri" pitchFamily="34" charset="0"/>
+              </a:rPr>
+              <a:t>Subsystem:</a:t>
+            </a:r>
+            <a:endParaRPr lang="en-US" dirty="0" smtClean="0">
+              <a:latin typeface="Calibri" pitchFamily="34" charset="0"/>
+              <a:cs typeface="Calibri" pitchFamily="34" charset="0"/>
+            </a:endParaRPr>
           </a:p>
           <a:p>
             <a:pPr marL="742950" lvl="1" indent="-285750">
@@ -13225,7 +13275,82 @@
                 <a:latin typeface="Calibri" pitchFamily="34" charset="0"/>
                 <a:cs typeface="Calibri" pitchFamily="34" charset="0"/>
               </a:rPr>
-              <a:t>High bit-rate peripherals: SRIO, PCIe, Ethernet, TSIP  </a:t>
+              <a:t>Lots of </a:t>
+            </a:r>
+            <a:r>
+              <a:rPr lang="en-US" dirty="0" smtClean="0">
+                <a:latin typeface="Calibri" pitchFamily="34" charset="0"/>
+                <a:cs typeface="Calibri" pitchFamily="34" charset="0"/>
+              </a:rPr>
+              <a:t>connectivity:</a:t>
+            </a:r>
+            <a:endParaRPr lang="en-US" dirty="0" smtClean="0">
+              <a:latin typeface="Calibri" pitchFamily="34" charset="0"/>
+              <a:cs typeface="Calibri" pitchFamily="34" charset="0"/>
+            </a:endParaRPr>
+          </a:p>
+          <a:p>
+            <a:pPr marL="742950" lvl="1" indent="-285750">
+              <a:buFont typeface="Calibri" pitchFamily="34" charset="0"/>
+              <a:buChar char="–"/>
+            </a:pPr>
+            <a:r>
+              <a:rPr lang="en-US" dirty="0" smtClean="0">
+                <a:latin typeface="Calibri" pitchFamily="34" charset="0"/>
+                <a:cs typeface="Calibri" pitchFamily="34" charset="0"/>
+              </a:rPr>
+              <a:t>High bit-rate peripherals: SRIO, PCIe</a:t>
+            </a:r>
+            <a:r>
+              <a:rPr lang="en-US" dirty="0" smtClean="0">
+                <a:latin typeface="Calibri" pitchFamily="34" charset="0"/>
+                <a:cs typeface="Calibri" pitchFamily="34" charset="0"/>
+              </a:rPr>
+              <a:t>, </a:t>
+            </a:r>
+            <a:r>
+              <a:rPr lang="en-US" dirty="0" smtClean="0">
+                <a:latin typeface="Calibri" pitchFamily="34" charset="0"/>
+                <a:cs typeface="Calibri" pitchFamily="34" charset="0"/>
+              </a:rPr>
+              <a:t>Ethernet</a:t>
+            </a:r>
+          </a:p>
+          <a:p>
+            <a:pPr marL="742950" lvl="1" indent="-285750">
+              <a:buFont typeface="Calibri" pitchFamily="34" charset="0"/>
+              <a:buChar char="–"/>
+            </a:pPr>
+            <a:r>
+              <a:rPr lang="en-US" dirty="0" smtClean="0">
+                <a:latin typeface="Calibri" pitchFamily="34" charset="0"/>
+                <a:cs typeface="Calibri" pitchFamily="34" charset="0"/>
+              </a:rPr>
+              <a:t>Device-specific: TSIP  </a:t>
+            </a:r>
+            <a:endParaRPr lang="en-US" dirty="0" smtClean="0">
+              <a:latin typeface="Calibri" pitchFamily="34" charset="0"/>
+              <a:cs typeface="Calibri" pitchFamily="34" charset="0"/>
+            </a:endParaRPr>
+          </a:p>
+          <a:p>
+            <a:pPr marL="742950" lvl="1" indent="-285750">
+              <a:buFont typeface="Calibri" pitchFamily="34" charset="0"/>
+              <a:buChar char="–"/>
+            </a:pPr>
+            <a:r>
+              <a:rPr lang="en-US" dirty="0" err="1" smtClean="0">
+                <a:latin typeface="Calibri" pitchFamily="34" charset="0"/>
+                <a:cs typeface="Calibri" pitchFamily="34" charset="0"/>
+              </a:rPr>
+              <a:t>HyperLink</a:t>
+            </a:r>
+            <a:r>
+              <a:rPr lang="en-US" dirty="0" smtClean="0">
+                <a:latin typeface="Calibri" pitchFamily="34" charset="0"/>
+                <a:cs typeface="Calibri" pitchFamily="34" charset="0"/>
+              </a:rPr>
+              <a:t>: Seamless interface</a:t>
             </a:r>
           </a:p>
           <a:p>
@@ -13238,7 +13363,14 @@
                 <a:latin typeface="Calibri" pitchFamily="34" charset="0"/>
                 <a:cs typeface="Calibri" pitchFamily="34" charset="0"/>
               </a:rPr>
-              <a:t>TeraNet:</a:t>
+              <a:t>TeraNet</a:t>
+            </a:r>
+            <a:r>
+              <a:rPr lang="en-US" dirty="0" smtClean="0">
+                <a:latin typeface="Calibri" pitchFamily="34" charset="0"/>
+                <a:cs typeface="Calibri" pitchFamily="34" charset="0"/>
+              </a:rPr>
+              <a:t>:</a:t>
             </a:r>
           </a:p>
           <a:p>
@@ -13279,36 +13411,6 @@
               </a:rPr>
               <a:t>Fast and wide </a:t>
             </a:r>
-          </a:p>
-          <a:p>
-            <a:pPr marL="285750" indent="-285750">
-              <a:buFont typeface="Arial" panose="020B0604020202020204" pitchFamily="34" charset="0"/>
-              <a:buChar char="•"/>
-            </a:pPr>
-            <a:r>
-              <a:rPr lang="en-US" dirty="0" smtClean="0">
-                <a:latin typeface="Calibri" pitchFamily="34" charset="0"/>
-                <a:cs typeface="Calibri" pitchFamily="34" charset="0"/>
-              </a:rPr>
-              <a:t>HyperLink: Seamless interface</a:t>
-            </a:r>
-          </a:p>
-          <a:p>
-            <a:pPr marL="285750" indent="-285750">
-              <a:buFont typeface="Arial" panose="020B0604020202020204" pitchFamily="34" charset="0"/>
-              <a:buChar char="•"/>
-            </a:pPr>
-            <a:r>
-              <a:rPr lang="en-US" dirty="0" smtClean="0">
-                <a:latin typeface="Calibri" pitchFamily="34" charset="0"/>
-                <a:cs typeface="Calibri" pitchFamily="34" charset="0"/>
-              </a:rPr>
-              <a:t>Lots of connectivity</a:t>
-            </a:r>
-            <a:endParaRPr lang="en-US" dirty="0">
-              <a:latin typeface="Calibri" pitchFamily="34" charset="0"/>
-              <a:cs typeface="Calibri" pitchFamily="34" charset="0"/>
-            </a:endParaRPr>
           </a:p>
         </p:txBody>
       </p:sp>
@@ -13368,13 +13470,20 @@
     </p:spTree>
     <p:extLst>
       <p:ext uri="{BB962C8B-B14F-4D97-AF65-F5344CB8AC3E}">
-        <p14:creationId xmlns:p14="http://schemas.microsoft.com/office/powerpoint/2010/main" val="2205743471"/>
+        <p14:creationId xmlns:p14="http://schemas.microsoft.com/office/powerpoint/2010/main" xmlns="" val="2205743471"/>
       </p:ext>
     </p:extLst>
   </p:cSld>
   <p:clrMapOvr>
     <a:masterClrMapping/>
   </p:clrMapOvr>
+  <p:timing>
+    <p:tnLst>
+      <p:par>
+        <p:cTn id="1" dur="indefinite" restart="never" nodeType="tmRoot"/>
+      </p:par>
+    </p:tnLst>
+  </p:timing>
 </p:sld>
 </file>
 
@@ -48174,7 +48283,7 @@
         </p:spPr>
         <p:txBody>
           <a:bodyPr wrap="square" rtlCol="0">
-            <a:normAutofit/>
+            <a:normAutofit lnSpcReduction="10000"/>
           </a:bodyPr>
           <a:lstStyle/>
           <a:p>
@@ -48196,15 +48305,65 @@
               <a:buChar char="•"/>
             </a:pPr>
             <a:r>
+              <a:rPr lang="en-US" b="1" dirty="0" smtClean="0">
+                <a:solidFill>
+                  <a:srgbClr val="DE0000"/>
+                </a:solidFill>
+                <a:latin typeface="Calibri" pitchFamily="34" charset="0"/>
+                <a:cs typeface="Calibri" pitchFamily="34" charset="0"/>
+              </a:rPr>
+              <a:t>Maintains most advantages of </a:t>
+            </a:r>
+            <a:r>
+              <a:rPr lang="en-US" b="1" dirty="0" err="1" smtClean="0">
+                <a:solidFill>
+                  <a:srgbClr val="DE0000"/>
+                </a:solidFill>
+                <a:latin typeface="Calibri" pitchFamily="34" charset="0"/>
+                <a:cs typeface="Calibri" pitchFamily="34" charset="0"/>
+              </a:rPr>
+              <a:t>KeyStone</a:t>
+            </a:r>
+            <a:r>
+              <a:rPr lang="en-US" b="1" dirty="0" smtClean="0">
+                <a:solidFill>
+                  <a:srgbClr val="DE0000"/>
+                </a:solidFill>
+                <a:latin typeface="Calibri" pitchFamily="34" charset="0"/>
+                <a:cs typeface="Calibri" pitchFamily="34" charset="0"/>
+              </a:rPr>
+              <a:t>, except:</a:t>
+            </a:r>
+            <a:endParaRPr lang="en-US" b="1" dirty="0" smtClean="0">
+              <a:solidFill>
+                <a:srgbClr val="DE0000"/>
+              </a:solidFill>
+              <a:latin typeface="Calibri" pitchFamily="34" charset="0"/>
+              <a:cs typeface="Calibri" pitchFamily="34" charset="0"/>
+            </a:endParaRPr>
+          </a:p>
+          <a:p>
+            <a:pPr marL="742950" lvl="1" indent="-285750">
+              <a:buFont typeface="Arial" panose="020B0604020202020204" pitchFamily="34" charset="0"/>
+              <a:buChar char="•"/>
+            </a:pPr>
+            <a:r>
               <a:rPr lang="en-US" dirty="0" smtClean="0">
                 <a:latin typeface="Calibri" pitchFamily="34" charset="0"/>
                 <a:cs typeface="Calibri" pitchFamily="34" charset="0"/>
               </a:rPr>
-              <a:t>Few, more generic, accelerators</a:t>
+              <a:t>Few</a:t>
+            </a:r>
+            <a:r>
+              <a:rPr lang="en-US" dirty="0" smtClean="0">
+                <a:latin typeface="Calibri" pitchFamily="34" charset="0"/>
+                <a:cs typeface="Calibri" pitchFamily="34" charset="0"/>
+              </a:rPr>
+              <a:t>, more generic, accelerators</a:t>
             </a:r>
           </a:p>
           <a:p>
-            <a:pPr marL="285750" indent="-285750">
+            <a:pPr marL="742950" lvl="1" indent="-285750">
               <a:buFont typeface="Arial" panose="020B0604020202020204" pitchFamily="34" charset="0"/>
               <a:buChar char="•"/>
             </a:pPr>
@@ -48217,7 +48376,7 @@
             </a:r>
           </a:p>
           <a:p>
-            <a:pPr marL="285750" indent="-285750">
+            <a:pPr marL="742950" lvl="1" indent="-285750">
               <a:buFont typeface="Arial" panose="020B0604020202020204" pitchFamily="34" charset="0"/>
               <a:buChar char="•"/>
             </a:pPr>
@@ -48230,7 +48389,7 @@
             </a:r>
           </a:p>
           <a:p>
-            <a:pPr marL="285750" indent="-285750">
+            <a:pPr marL="742950" lvl="1" indent="-285750">
               <a:buFont typeface="Arial" panose="020B0604020202020204" pitchFamily="34" charset="0"/>
               <a:buChar char="•"/>
             </a:pPr>
@@ -48240,22 +48399,6 @@
                 <a:cs typeface="Calibri" pitchFamily="34" charset="0"/>
               </a:rPr>
               <a:t>Smaller, slower DDR, less pins</a:t>
-            </a:r>
-          </a:p>
-          <a:p>
-            <a:pPr marL="285750" indent="-285750">
-              <a:buFont typeface="Arial" panose="020B0604020202020204" pitchFamily="34" charset="0"/>
-              <a:buChar char="•"/>
-            </a:pPr>
-            <a:r>
-              <a:rPr lang="en-US" sz="2000" b="1" dirty="0" smtClean="0">
-                <a:solidFill>
-                  <a:srgbClr val="DE0000"/>
-                </a:solidFill>
-                <a:latin typeface="Calibri" pitchFamily="34" charset="0"/>
-                <a:cs typeface="Calibri" pitchFamily="34" charset="0"/>
-              </a:rPr>
-              <a:t>Maintains most advantages of KeyStone </a:t>
             </a:r>
           </a:p>
           <a:p>
@@ -48343,8 +48486,12 @@
                 <a:latin typeface="Calibri" pitchFamily="34" charset="0"/>
                 <a:cs typeface="Calibri" pitchFamily="34" charset="0"/>
               </a:rPr>
-              <a:t>Sealed box, power limitations</a:t>
+              <a:t>Power limitations (sealed box)</a:t>
             </a:r>
+            <a:endParaRPr lang="en-US" dirty="0" smtClean="0">
+              <a:latin typeface="Calibri" pitchFamily="34" charset="0"/>
+              <a:cs typeface="Calibri" pitchFamily="34" charset="0"/>
+            </a:endParaRPr>
           </a:p>
           <a:p>
             <a:pPr marL="285750" indent="-285750">
@@ -48482,7 +48629,7 @@
           <p:nvPr>
             <p:extLst>
               <p:ext uri="{D42A27DB-BD31-4B8C-83A1-F6EECF244321}">
-                <p14:modId xmlns:p14="http://schemas.microsoft.com/office/powerpoint/2010/main" val="4119681246"/>
+                <p14:modId xmlns:p14="http://schemas.microsoft.com/office/powerpoint/2010/main" xmlns="" val="4119681246"/>
               </p:ext>
             </p:extLst>
           </p:nvPr>
@@ -48493,59 +48640,9 @@
         </p:xfrm>
         <a:graphic>
           <a:graphicData uri="http://schemas.openxmlformats.org/presentationml/2006/ole">
-            <mc:AlternateContent xmlns:mc="http://schemas.openxmlformats.org/markup-compatibility/2006">
-              <mc:Choice xmlns:v="urn:schemas-microsoft-com:vml" Requires="v">
-                <p:oleObj spid="_x0000_s82949" name="Visio" r:id="rId3" imgW="8321715" imgH="6803957" progId="Visio.Drawing.11">
-                  <p:embed/>
-                </p:oleObj>
-              </mc:Choice>
-              <mc:Fallback>
-                <p:oleObj name="Visio" r:id="rId3" imgW="8321715" imgH="6803957" progId="Visio.Drawing.11">
-                  <p:embed/>
-                  <p:pic>
-                    <p:nvPicPr>
-                      <p:cNvPr id="0" name="Picture 2"/>
-                      <p:cNvPicPr>
-                        <a:picLocks noChangeAspect="1" noChangeArrowheads="1"/>
-                      </p:cNvPicPr>
-                      <p:nvPr/>
-                    </p:nvPicPr>
-                    <p:blipFill>
-                      <a:blip r:embed="rId4">
-                        <a:extLst>
-                          <a:ext uri="{28A0092B-C50C-407E-A947-70E740481C1C}">
-                            <a14:useLocalDpi xmlns:a14="http://schemas.microsoft.com/office/drawing/2010/main" val="0"/>
-                          </a:ext>
-                        </a:extLst>
-                      </a:blip>
-                      <a:srcRect/>
-                      <a:stretch>
-                        <a:fillRect/>
-                      </a:stretch>
-                    </p:blipFill>
-                    <p:spPr bwMode="auto">
-                      <a:xfrm>
-                        <a:off x="1141413" y="885825"/>
-                        <a:ext cx="6591300" cy="5391150"/>
-                      </a:xfrm>
-                      <a:prstGeom prst="rect">
-                        <a:avLst/>
-                      </a:prstGeom>
-                      <a:noFill/>
-                      <a:extLst>
-                        <a:ext uri="{909E8E84-426E-40DD-AFC4-6F175D3DCCD1}">
-                          <a14:hiddenFill xmlns:a14="http://schemas.microsoft.com/office/drawing/2010/main">
-                            <a:solidFill>
-                              <a:srgbClr val="FFFFFF"/>
-                            </a:solidFill>
-                          </a14:hiddenFill>
-                        </a:ext>
-                      </a:extLst>
-                    </p:spPr>
-                  </p:pic>
-                </p:oleObj>
-              </mc:Fallback>
-            </mc:AlternateContent>
+            <p:oleObj spid="_x0000_s82949" name="Visio" r:id="rId3" imgW="8321715" imgH="6803957" progId="">
+              <p:embed/>
+            </p:oleObj>
           </a:graphicData>
         </a:graphic>
       </p:graphicFrame>
@@ -48655,13 +48752,20 @@
     </p:spTree>
     <p:extLst>
       <p:ext uri="{BB962C8B-B14F-4D97-AF65-F5344CB8AC3E}">
-        <p14:creationId xmlns:p14="http://schemas.microsoft.com/office/powerpoint/2010/main" val="2385042335"/>
+        <p14:creationId xmlns:p14="http://schemas.microsoft.com/office/powerpoint/2010/main" xmlns="" val="2385042335"/>
       </p:ext>
     </p:extLst>
   </p:cSld>
   <p:clrMapOvr>
     <a:masterClrMapping/>
   </p:clrMapOvr>
+  <p:timing>
+    <p:tnLst>
+      <p:par>
+        <p:cTn id="1" dur="indefinite" restart="never" nodeType="tmRoot"/>
+      </p:par>
+    </p:tnLst>
+  </p:timing>
 </p:sld>
 </file>
 
@@ -48735,14 +48839,14 @@
           <a:effectLst/>
           <a:extLst>
             <a:ext uri="{909E8E84-426E-40DD-AFC4-6F175D3DCCD1}">
-              <a14:hiddenFill xmlns:a14="http://schemas.microsoft.com/office/drawing/2010/main">
+              <a14:hiddenFill xmlns:a14="http://schemas.microsoft.com/office/drawing/2010/main" xmlns="">
                 <a:solidFill>
                   <a:schemeClr val="accent1"/>
                 </a:solidFill>
               </a14:hiddenFill>
             </a:ext>
             <a:ext uri="{91240B29-F687-4F45-9708-019B960494DF}">
-              <a14:hiddenLine xmlns:a14="http://schemas.microsoft.com/office/drawing/2010/main" w="9525">
+              <a14:hiddenLine xmlns:a14="http://schemas.microsoft.com/office/drawing/2010/main" xmlns="" w="9525">
                 <a:solidFill>
                   <a:schemeClr val="tx1"/>
                 </a:solidFill>
@@ -48752,7 +48856,7 @@
               </a14:hiddenLine>
             </a:ext>
             <a:ext uri="{AF507438-7753-43E0-B8FC-AC1667EBCBE1}">
-              <a14:hiddenEffects xmlns:a14="http://schemas.microsoft.com/office/drawing/2010/main">
+              <a14:hiddenEffects xmlns:a14="http://schemas.microsoft.com/office/drawing/2010/main" xmlns="">
                 <a:effectLst>
                   <a:outerShdw dist="35921" dir="2700000" algn="ctr" rotWithShape="0">
                     <a:schemeClr val="bg2"/>
@@ -48810,7 +48914,7 @@
           <p:nvPr>
             <p:extLst>
               <p:ext uri="{D42A27DB-BD31-4B8C-83A1-F6EECF244321}">
-                <p14:modId xmlns:p14="http://schemas.microsoft.com/office/powerpoint/2010/main" val="717525081"/>
+                <p14:modId xmlns:p14="http://schemas.microsoft.com/office/powerpoint/2010/main" xmlns="" val="717525081"/>
               </p:ext>
             </p:extLst>
           </p:nvPr>
@@ -48821,59 +48925,9 @@
         </p:xfrm>
         <a:graphic>
           <a:graphicData uri="http://schemas.openxmlformats.org/presentationml/2006/ole">
-            <mc:AlternateContent xmlns:mc="http://schemas.openxmlformats.org/markup-compatibility/2006">
-              <mc:Choice xmlns:v="urn:schemas-microsoft-com:vml" Requires="v">
-                <p:oleObj spid="_x0000_s83973" name="Visio" r:id="rId3" imgW="8321715" imgH="6803957" progId="Visio.Drawing.11">
-                  <p:embed/>
-                </p:oleObj>
-              </mc:Choice>
-              <mc:Fallback>
-                <p:oleObj name="Visio" r:id="rId3" imgW="8321715" imgH="6803957" progId="Visio.Drawing.11">
-                  <p:embed/>
-                  <p:pic>
-                    <p:nvPicPr>
-                      <p:cNvPr id="0" name="Picture 2"/>
-                      <p:cNvPicPr>
-                        <a:picLocks noChangeAspect="1" noChangeArrowheads="1"/>
-                      </p:cNvPicPr>
-                      <p:nvPr/>
-                    </p:nvPicPr>
-                    <p:blipFill>
-                      <a:blip r:embed="rId4">
-                        <a:extLst>
-                          <a:ext uri="{28A0092B-C50C-407E-A947-70E740481C1C}">
-                            <a14:useLocalDpi xmlns:a14="http://schemas.microsoft.com/office/drawing/2010/main" val="0"/>
-                          </a:ext>
-                        </a:extLst>
-                      </a:blip>
-                      <a:srcRect/>
-                      <a:stretch>
-                        <a:fillRect/>
-                      </a:stretch>
-                    </p:blipFill>
-                    <p:spPr bwMode="auto">
-                      <a:xfrm>
-                        <a:off x="1143000" y="890025"/>
-                        <a:ext cx="6599238" cy="5395714"/>
-                      </a:xfrm>
-                      <a:prstGeom prst="rect">
-                        <a:avLst/>
-                      </a:prstGeom>
-                      <a:noFill/>
-                      <a:extLst>
-                        <a:ext uri="{909E8E84-426E-40DD-AFC4-6F175D3DCCD1}">
-                          <a14:hiddenFill xmlns:a14="http://schemas.microsoft.com/office/drawing/2010/main">
-                            <a:solidFill>
-                              <a:srgbClr val="FFFFFF"/>
-                            </a:solidFill>
-                          </a14:hiddenFill>
-                        </a:ext>
-                      </a:extLst>
-                    </p:spPr>
-                  </p:pic>
-                </p:oleObj>
-              </mc:Fallback>
-            </mc:AlternateContent>
+            <p:oleObj spid="_x0000_s83973" name="Visio" r:id="rId3" imgW="8321715" imgH="6803957" progId="">
+              <p:embed/>
+            </p:oleObj>
           </a:graphicData>
         </a:graphic>
       </p:graphicFrame>
@@ -48909,13 +48963,20 @@
     </p:spTree>
     <p:extLst>
       <p:ext uri="{BB962C8B-B14F-4D97-AF65-F5344CB8AC3E}">
-        <p14:creationId xmlns:p14="http://schemas.microsoft.com/office/powerpoint/2010/main" val="799163121"/>
+        <p14:creationId xmlns:p14="http://schemas.microsoft.com/office/powerpoint/2010/main" xmlns="" val="799163121"/>
       </p:ext>
     </p:extLst>
   </p:cSld>
   <p:clrMapOvr>
     <a:masterClrMapping/>
   </p:clrMapOvr>
+  <p:timing>
+    <p:tnLst>
+      <p:par>
+        <p:cTn id="1" dur="indefinite" restart="never" nodeType="tmRoot"/>
+      </p:par>
+    </p:tnLst>
+  </p:timing>
 </p:sld>
 </file>
 

</xml_diff>

<commit_message>
Revised K2H diagram, K2H compared to K2E (RJH)
</commit_message>
<xml_diff>
--- a/slides/KeyStone_Edison.pptx
+++ b/slides/KeyStone_Edison.pptx
@@ -377,7 +377,7 @@
     </p:spTree>
     <p:extLst>
       <p:ext uri="{BB962C8B-B14F-4D97-AF65-F5344CB8AC3E}">
-        <p14:creationId xmlns:p14="http://schemas.microsoft.com/office/powerpoint/2010/main" xmlns="" val="4170102886"/>
+        <p14:creationId xmlns="" xmlns:p14="http://schemas.microsoft.com/office/powerpoint/2010/main" val="4170102886"/>
       </p:ext>
     </p:extLst>
   </p:cSld>
@@ -690,7 +690,7 @@
     </p:spTree>
     <p:extLst>
       <p:ext uri="{BB962C8B-B14F-4D97-AF65-F5344CB8AC3E}">
-        <p14:creationId xmlns:p14="http://schemas.microsoft.com/office/powerpoint/2010/main" xmlns="" val="419590164"/>
+        <p14:creationId xmlns="" xmlns:p14="http://schemas.microsoft.com/office/powerpoint/2010/main" val="419590164"/>
       </p:ext>
     </p:extLst>
   </p:cSld>
@@ -5992,11 +5992,7 @@
           <a:p>
             <a:r>
               <a:rPr lang="en-US" dirty="0" smtClean="0"/>
-              <a:t>Ran </a:t>
-            </a:r>
-            <a:r>
-              <a:rPr lang="en-US" dirty="0" smtClean="0"/>
-              <a:t>Katzur, Senior Applications Engineer, Training Lead</a:t>
+              <a:t>Ran Katzur, Senior Applications Engineer, Training Lead</a:t>
             </a:r>
             <a:endParaRPr lang="en-US" dirty="0"/>
           </a:p>
@@ -6127,13 +6123,7 @@
               <a:rPr lang="en-US" sz="2400" kern="1200" dirty="0" smtClean="0">
                 <a:ea typeface="+mn-ea"/>
               </a:rPr>
-              <a:t>Powerful Quad-ARM </a:t>
-            </a:r>
-            <a:r>
-              <a:rPr lang="en-US" sz="2400" kern="1200" dirty="0" smtClean="0">
-                <a:ea typeface="+mn-ea"/>
-              </a:rPr>
-              <a:t>A15 </a:t>
+              <a:t>Powerful Quad-ARM A15 </a:t>
             </a:r>
             <a:r>
               <a:rPr lang="en-US" sz="2400" kern="1200" dirty="0" err="1" smtClean="0">
@@ -6145,25 +6135,7 @@
               <a:rPr lang="en-US" sz="2400" kern="1200" dirty="0" smtClean="0">
                 <a:ea typeface="+mn-ea"/>
               </a:rPr>
-              <a:t> </a:t>
-            </a:r>
-            <a:r>
-              <a:rPr lang="en-US" sz="2400" kern="1200" dirty="0" smtClean="0">
-                <a:ea typeface="+mn-ea"/>
-              </a:rPr>
-              <a:t>with </a:t>
-            </a:r>
-            <a:r>
-              <a:rPr lang="en-US" sz="2400" kern="1200" dirty="0" smtClean="0">
-                <a:ea typeface="+mn-ea"/>
-              </a:rPr>
-              <a:t>0-1 DSP </a:t>
-            </a:r>
-            <a:r>
-              <a:rPr lang="en-US" sz="2400" kern="1200" dirty="0" smtClean="0">
-                <a:ea typeface="+mn-ea"/>
-              </a:rPr>
-              <a:t>CorePac support, as needed</a:t>
+              <a:t> with 0-1 DSP CorePac support, as needed</a:t>
             </a:r>
           </a:p>
           <a:p>
@@ -6272,9 +6244,6 @@
               </a:rPr>
               <a:t> (No SRIO)</a:t>
             </a:r>
-            <a:endParaRPr lang="en-US" sz="2000" kern="1200" dirty="0" smtClean="0">
-              <a:ea typeface="+mn-ea"/>
-            </a:endParaRPr>
           </a:p>
           <a:p>
             <a:pPr marL="742950" lvl="1" indent="-285750">
@@ -6368,17 +6337,8 @@
               <a:rPr lang="en-US" sz="2400" kern="1200" dirty="0" smtClean="0">
                 <a:ea typeface="+mn-ea"/>
               </a:rPr>
-              <a:t>Fast (1600 MHz), wide (72 bits), and large (8G) external </a:t>
+              <a:t>Fast (1600 MHz), wide (72 bits), and large (8G) external memory; DDRA only</a:t>
             </a:r>
-            <a:r>
-              <a:rPr lang="en-US" sz="2400" kern="1200" dirty="0" smtClean="0">
-                <a:ea typeface="+mn-ea"/>
-              </a:rPr>
-              <a:t>memory; DDRA only</a:t>
-            </a:r>
-            <a:endParaRPr lang="en-US" sz="2400" kern="1200" dirty="0" smtClean="0">
-              <a:ea typeface="+mn-ea"/>
-            </a:endParaRPr>
           </a:p>
           <a:p>
             <a:endParaRPr lang="en-US" dirty="0" smtClean="0"/>
@@ -6391,7 +6351,7 @@
     </p:spTree>
     <p:extLst>
       <p:ext uri="{BB962C8B-B14F-4D97-AF65-F5344CB8AC3E}">
-        <p14:creationId xmlns:p14="http://schemas.microsoft.com/office/powerpoint/2010/main" xmlns="" val="300334443"/>
+        <p14:creationId xmlns="" xmlns:p14="http://schemas.microsoft.com/office/powerpoint/2010/main" val="300334443"/>
       </p:ext>
     </p:extLst>
   </p:cSld>
@@ -6464,14 +6424,14 @@
           <p:nvPr>
             <p:extLst>
               <p:ext uri="{D42A27DB-BD31-4B8C-83A1-F6EECF244321}">
-                <p14:modId xmlns:p14="http://schemas.microsoft.com/office/powerpoint/2010/main" xmlns="" val="2536914482"/>
+                <p14:modId xmlns="" xmlns:p14="http://schemas.microsoft.com/office/powerpoint/2010/main" val="2536914482"/>
               </p:ext>
             </p:extLst>
           </p:nvPr>
         </p:nvGraphicFramePr>
         <p:xfrm>
-          <a:off x="1199693" y="1777586"/>
-          <a:ext cx="6620256" cy="3723443"/>
+          <a:off x="1206950" y="1276843"/>
+          <a:ext cx="6620256" cy="4496248"/>
         </p:xfrm>
         <a:graphic>
           <a:graphicData uri="http://schemas.openxmlformats.org/drawingml/2006/table">
@@ -6606,6 +6566,129 @@
                         </a:spcAft>
                       </a:pPr>
                       <a:r>
+                        <a:rPr lang="en-US" sz="1400" dirty="0" smtClean="0">
+                          <a:effectLst/>
+                          <a:latin typeface="Calibri" pitchFamily="34" charset="0"/>
+                          <a:cs typeface="Calibri" pitchFamily="34" charset="0"/>
+                        </a:rPr>
+                        <a:t>ARM </a:t>
+                      </a:r>
+                      <a:r>
+                        <a:rPr lang="en-US" sz="1400" dirty="0" err="1" smtClean="0">
+                          <a:effectLst/>
+                          <a:latin typeface="Calibri" pitchFamily="34" charset="0"/>
+                          <a:cs typeface="Calibri" pitchFamily="34" charset="0"/>
+                        </a:rPr>
+                        <a:t>CorePacs</a:t>
+                      </a:r>
+                      <a:endParaRPr lang="en-US" sz="1400" dirty="0">
+                        <a:effectLst/>
+                        <a:latin typeface="Calibri" pitchFamily="34" charset="0"/>
+                        <a:ea typeface="Times New Roman"/>
+                        <a:cs typeface="Calibri" pitchFamily="34" charset="0"/>
+                      </a:endParaRPr>
+                    </a:p>
+                  </a:txBody>
+                  <a:tcPr marL="68580" marR="68580" marT="0" marB="0"/>
+                </a:tc>
+                <a:tc>
+                  <a:txBody>
+                    <a:bodyPr/>
+                    <a:lstStyle/>
+                    <a:p>
+                      <a:pPr marL="0" marR="0">
+                        <a:lnSpc>
+                          <a:spcPct val="115000"/>
+                        </a:lnSpc>
+                        <a:spcBef>
+                          <a:spcPts val="0"/>
+                        </a:spcBef>
+                        <a:spcAft>
+                          <a:spcPts val="0"/>
+                        </a:spcAft>
+                      </a:pPr>
+                      <a:r>
+                        <a:rPr lang="en-US" sz="1400" dirty="0" smtClean="0">
+                          <a:effectLst/>
+                          <a:latin typeface="Calibri" pitchFamily="34" charset="0"/>
+                          <a:ea typeface="Times New Roman"/>
+                          <a:cs typeface="Calibri" pitchFamily="34" charset="0"/>
+                        </a:rPr>
+                        <a:t>2</a:t>
+                      </a:r>
+                      <a:r>
+                        <a:rPr lang="en-US" sz="1400" baseline="0" dirty="0" smtClean="0">
+                          <a:effectLst/>
+                          <a:latin typeface="Calibri" pitchFamily="34" charset="0"/>
+                          <a:ea typeface="Times New Roman"/>
+                          <a:cs typeface="Calibri" pitchFamily="34" charset="0"/>
+                        </a:rPr>
+                        <a:t> or 4</a:t>
+                      </a:r>
+                      <a:endParaRPr lang="en-US" sz="1400" dirty="0">
+                        <a:effectLst/>
+                        <a:latin typeface="Calibri" pitchFamily="34" charset="0"/>
+                        <a:ea typeface="Times New Roman"/>
+                        <a:cs typeface="Calibri" pitchFamily="34" charset="0"/>
+                      </a:endParaRPr>
+                    </a:p>
+                  </a:txBody>
+                  <a:tcPr marL="68580" marR="68580" marT="0" marB="0"/>
+                </a:tc>
+                <a:tc>
+                  <a:txBody>
+                    <a:bodyPr/>
+                    <a:lstStyle/>
+                    <a:p>
+                      <a:pPr marL="0" marR="0">
+                        <a:lnSpc>
+                          <a:spcPct val="115000"/>
+                        </a:lnSpc>
+                        <a:spcBef>
+                          <a:spcPts val="0"/>
+                        </a:spcBef>
+                        <a:spcAft>
+                          <a:spcPts val="0"/>
+                        </a:spcAft>
+                      </a:pPr>
+                      <a:r>
+                        <a:rPr lang="en-US" sz="1400" dirty="0" smtClean="0">
+                          <a:effectLst/>
+                          <a:latin typeface="Calibri" pitchFamily="34" charset="0"/>
+                          <a:ea typeface="Times New Roman"/>
+                          <a:cs typeface="Calibri" pitchFamily="34" charset="0"/>
+                        </a:rPr>
+                        <a:t>1, 2, or 4</a:t>
+                      </a:r>
+                      <a:endParaRPr lang="en-US" sz="1400" dirty="0">
+                        <a:effectLst/>
+                        <a:latin typeface="Calibri" pitchFamily="34" charset="0"/>
+                        <a:ea typeface="Times New Roman"/>
+                        <a:cs typeface="Calibri" pitchFamily="34" charset="0"/>
+                      </a:endParaRPr>
+                    </a:p>
+                  </a:txBody>
+                  <a:tcPr marL="68580" marR="68580" marT="0" marB="0"/>
+                </a:tc>
+              </a:tr>
+              <a:tr h="247201">
+                <a:tc>
+                  <a:txBody>
+                    <a:bodyPr/>
+                    <a:lstStyle/>
+                    <a:p>
+                      <a:pPr marL="0" marR="0">
+                        <a:lnSpc>
+                          <a:spcPct val="115000"/>
+                        </a:lnSpc>
+                        <a:spcBef>
+                          <a:spcPts val="0"/>
+                        </a:spcBef>
+                        <a:spcAft>
+                          <a:spcPts val="0"/>
+                        </a:spcAft>
+                      </a:pPr>
+                      <a:r>
                         <a:rPr lang="en-US" sz="1400" dirty="0">
                           <a:effectLst/>
                           <a:latin typeface="Calibri" pitchFamily="34" charset="0"/>
@@ -6648,12 +6731,12 @@
                         </a:spcAft>
                       </a:pPr>
                       <a:r>
-                        <a:rPr lang="en-US" sz="1400" dirty="0">
+                        <a:rPr lang="en-US" sz="1400" dirty="0" smtClean="0">
                           <a:effectLst/>
                           <a:latin typeface="Calibri" pitchFamily="34" charset="0"/>
                           <a:cs typeface="Calibri" pitchFamily="34" charset="0"/>
                         </a:rPr>
-                        <a:t>Up to 8</a:t>
+                        <a:t>4 or 8</a:t>
                       </a:r>
                       <a:endParaRPr lang="en-US" sz="1100" dirty="0">
                         <a:effectLst/>
@@ -7113,12 +7196,12 @@
                         </a:spcAft>
                       </a:pPr>
                       <a:r>
-                        <a:rPr lang="en-US" sz="1400" dirty="0">
+                        <a:rPr lang="en-US" sz="1400" dirty="0" smtClean="0">
                           <a:effectLst/>
                           <a:latin typeface="Calibri" pitchFamily="34" charset="0"/>
                           <a:cs typeface="Calibri" pitchFamily="34" charset="0"/>
                         </a:rPr>
-                        <a:t>5</a:t>
+                        <a:t>5x</a:t>
                       </a:r>
                       <a:endParaRPr lang="en-US" sz="1100" dirty="0">
                         <a:effectLst/>
@@ -7147,12 +7230,12 @@
                         </a:spcAft>
                       </a:pPr>
                       <a:r>
-                        <a:rPr lang="en-US" sz="1400" dirty="0">
+                        <a:rPr lang="en-US" sz="1400" dirty="0" smtClean="0">
                           <a:effectLst/>
                           <a:latin typeface="Calibri" pitchFamily="34" charset="0"/>
                           <a:cs typeface="Calibri" pitchFamily="34" charset="0"/>
                         </a:rPr>
-                        <a:t>3</a:t>
+                        <a:t>3x</a:t>
                       </a:r>
                       <a:endParaRPr lang="en-US" sz="1100" dirty="0">
                         <a:effectLst/>
@@ -7217,12 +7300,12 @@
                         </a:spcAft>
                       </a:pPr>
                       <a:r>
-                        <a:rPr lang="en-US" sz="1400" dirty="0">
+                        <a:rPr lang="en-US" sz="1400" smtClean="0">
                           <a:effectLst/>
                           <a:latin typeface="Calibri" pitchFamily="34" charset="0"/>
                           <a:cs typeface="Calibri" pitchFamily="34" charset="0"/>
                         </a:rPr>
-                        <a:t>4 lanes </a:t>
+                        <a:t>4x </a:t>
                       </a:r>
                       <a:r>
                         <a:rPr lang="en-US" sz="1400" dirty="0" smtClean="0">
@@ -7482,12 +7565,12 @@
                         </a:spcAft>
                       </a:pPr>
                       <a:r>
-                        <a:rPr lang="en-US" sz="1400" dirty="0">
+                        <a:rPr lang="en-US" sz="1400" dirty="0" smtClean="0">
                           <a:effectLst/>
                           <a:latin typeface="Calibri" pitchFamily="34" charset="0"/>
                           <a:cs typeface="Calibri" pitchFamily="34" charset="0"/>
                         </a:rPr>
-                        <a:t>2 Links</a:t>
+                        <a:t>2x</a:t>
                       </a:r>
                       <a:endParaRPr lang="en-US" sz="1100" dirty="0">
                         <a:effectLst/>
@@ -7516,12 +7599,222 @@
                         </a:spcAft>
                       </a:pPr>
                       <a:r>
-                        <a:rPr lang="en-US" sz="1400" dirty="0">
+                        <a:rPr lang="en-US" sz="1400" dirty="0" smtClean="0">
                           <a:effectLst/>
                           <a:latin typeface="Calibri" pitchFamily="34" charset="0"/>
                           <a:cs typeface="Calibri" pitchFamily="34" charset="0"/>
                         </a:rPr>
-                        <a:t>1 link</a:t>
+                        <a:t>1x</a:t>
+                      </a:r>
+                      <a:endParaRPr lang="en-US" sz="1100" dirty="0">
+                        <a:effectLst/>
+                        <a:latin typeface="Calibri" pitchFamily="34" charset="0"/>
+                        <a:ea typeface="Times New Roman"/>
+                        <a:cs typeface="Calibri" pitchFamily="34" charset="0"/>
+                      </a:endParaRPr>
+                    </a:p>
+                  </a:txBody>
+                  <a:tcPr marL="68580" marR="68580" marT="0" marB="0"/>
+                </a:tc>
+              </a:tr>
+              <a:tr h="264347">
+                <a:tc>
+                  <a:txBody>
+                    <a:bodyPr/>
+                    <a:lstStyle/>
+                    <a:p>
+                      <a:pPr marL="0" marR="0">
+                        <a:lnSpc>
+                          <a:spcPct val="115000"/>
+                        </a:lnSpc>
+                        <a:spcBef>
+                          <a:spcPts val="0"/>
+                        </a:spcBef>
+                        <a:spcAft>
+                          <a:spcPts val="0"/>
+                        </a:spcAft>
+                      </a:pPr>
+                      <a:r>
+                        <a:rPr lang="en-US" sz="1400" dirty="0" smtClean="0">
+                          <a:effectLst/>
+                          <a:latin typeface="Calibri" pitchFamily="34" charset="0"/>
+                          <a:cs typeface="Calibri" pitchFamily="34" charset="0"/>
+                        </a:rPr>
+                        <a:t>5-Port 1GB Switch</a:t>
+                      </a:r>
+                      <a:endParaRPr lang="en-US" sz="1100" dirty="0">
+                        <a:effectLst/>
+                        <a:latin typeface="Calibri" pitchFamily="34" charset="0"/>
+                        <a:ea typeface="Times New Roman"/>
+                        <a:cs typeface="Calibri" pitchFamily="34" charset="0"/>
+                      </a:endParaRPr>
+                    </a:p>
+                  </a:txBody>
+                  <a:tcPr marL="68580" marR="68580" marT="0" marB="0"/>
+                </a:tc>
+                <a:tc>
+                  <a:txBody>
+                    <a:bodyPr/>
+                    <a:lstStyle/>
+                    <a:p>
+                      <a:pPr marL="0" marR="0">
+                        <a:lnSpc>
+                          <a:spcPct val="115000"/>
+                        </a:lnSpc>
+                        <a:spcBef>
+                          <a:spcPts val="0"/>
+                        </a:spcBef>
+                        <a:spcAft>
+                          <a:spcPts val="0"/>
+                        </a:spcAft>
+                      </a:pPr>
+                      <a:r>
+                        <a:rPr lang="en-US" sz="1400" dirty="0" smtClean="0">
+                          <a:effectLst/>
+                          <a:latin typeface="Calibri" pitchFamily="34" charset="0"/>
+                          <a:ea typeface="+mn-ea"/>
+                          <a:cs typeface="Calibri" pitchFamily="34" charset="0"/>
+                        </a:rPr>
+                        <a:t>1x</a:t>
+                      </a:r>
+                      <a:endParaRPr lang="en-US" sz="1100" dirty="0">
+                        <a:effectLst/>
+                        <a:latin typeface="Calibri" pitchFamily="34" charset="0"/>
+                        <a:ea typeface="Times New Roman"/>
+                        <a:cs typeface="Calibri" pitchFamily="34" charset="0"/>
+                      </a:endParaRPr>
+                    </a:p>
+                  </a:txBody>
+                  <a:tcPr marL="68580" marR="68580" marT="0" marB="0"/>
+                </a:tc>
+                <a:tc>
+                  <a:txBody>
+                    <a:bodyPr/>
+                    <a:lstStyle/>
+                    <a:p>
+                      <a:pPr marL="0" marR="0">
+                        <a:lnSpc>
+                          <a:spcPct val="115000"/>
+                        </a:lnSpc>
+                        <a:spcBef>
+                          <a:spcPts val="0"/>
+                        </a:spcBef>
+                        <a:spcAft>
+                          <a:spcPts val="0"/>
+                        </a:spcAft>
+                      </a:pPr>
+                      <a:r>
+                        <a:rPr lang="en-US" sz="1400" dirty="0" smtClean="0">
+                          <a:effectLst/>
+                          <a:latin typeface="Calibri" pitchFamily="34" charset="0"/>
+                          <a:cs typeface="Calibri" pitchFamily="34" charset="0"/>
+                        </a:rPr>
+                        <a:t>1-2x</a:t>
+                      </a:r>
+                      <a:endParaRPr lang="en-US" sz="1100" dirty="0">
+                        <a:effectLst/>
+                        <a:latin typeface="Calibri" pitchFamily="34" charset="0"/>
+                        <a:ea typeface="Times New Roman"/>
+                        <a:cs typeface="Calibri" pitchFamily="34" charset="0"/>
+                      </a:endParaRPr>
+                    </a:p>
+                  </a:txBody>
+                  <a:tcPr marL="68580" marR="68580" marT="0" marB="0"/>
+                </a:tc>
+              </a:tr>
+              <a:tr h="261257">
+                <a:tc>
+                  <a:txBody>
+                    <a:bodyPr/>
+                    <a:lstStyle/>
+                    <a:p>
+                      <a:pPr marL="0" marR="0">
+                        <a:lnSpc>
+                          <a:spcPct val="115000"/>
+                        </a:lnSpc>
+                        <a:spcBef>
+                          <a:spcPts val="0"/>
+                        </a:spcBef>
+                        <a:spcAft>
+                          <a:spcPts val="0"/>
+                        </a:spcAft>
+                      </a:pPr>
+                      <a:r>
+                        <a:rPr lang="en-US" sz="1400" dirty="0" smtClean="0">
+                          <a:effectLst/>
+                          <a:latin typeface="Calibri" pitchFamily="34" charset="0"/>
+                          <a:cs typeface="Calibri" pitchFamily="34" charset="0"/>
+                        </a:rPr>
+                        <a:t>3-Port 10GB Switch</a:t>
+                      </a:r>
+                      <a:endParaRPr lang="en-US" sz="1100" dirty="0">
+                        <a:effectLst/>
+                        <a:latin typeface="Calibri" pitchFamily="34" charset="0"/>
+                        <a:ea typeface="Times New Roman"/>
+                        <a:cs typeface="Calibri" pitchFamily="34" charset="0"/>
+                      </a:endParaRPr>
+                    </a:p>
+                  </a:txBody>
+                  <a:tcPr marL="68580" marR="68580" marT="0" marB="0"/>
+                </a:tc>
+                <a:tc>
+                  <a:txBody>
+                    <a:bodyPr/>
+                    <a:lstStyle/>
+                    <a:p>
+                      <a:pPr marL="0" marR="0">
+                        <a:lnSpc>
+                          <a:spcPct val="115000"/>
+                        </a:lnSpc>
+                        <a:spcBef>
+                          <a:spcPts val="0"/>
+                        </a:spcBef>
+                        <a:spcAft>
+                          <a:spcPts val="0"/>
+                        </a:spcAft>
+                      </a:pPr>
+                      <a:r>
+                        <a:rPr lang="en-US" sz="1400" dirty="0" smtClean="0">
+                          <a:effectLst/>
+                          <a:latin typeface="Calibri" pitchFamily="34" charset="0"/>
+                          <a:ea typeface="+mn-ea"/>
+                          <a:cs typeface="Calibri" pitchFamily="34" charset="0"/>
+                        </a:rPr>
+                        <a:t>NA</a:t>
+                      </a:r>
+                      <a:endParaRPr lang="en-US" sz="1100" dirty="0">
+                        <a:effectLst/>
+                        <a:latin typeface="Calibri" pitchFamily="34" charset="0"/>
+                        <a:ea typeface="Times New Roman"/>
+                        <a:cs typeface="Calibri" pitchFamily="34" charset="0"/>
+                      </a:endParaRPr>
+                    </a:p>
+                  </a:txBody>
+                  <a:tcPr marL="68580" marR="68580" marT="0" marB="0"/>
+                </a:tc>
+                <a:tc>
+                  <a:txBody>
+                    <a:bodyPr/>
+                    <a:lstStyle/>
+                    <a:p>
+                      <a:pPr marL="0" marR="0">
+                        <a:lnSpc>
+                          <a:spcPct val="115000"/>
+                        </a:lnSpc>
+                        <a:spcBef>
+                          <a:spcPts val="0"/>
+                        </a:spcBef>
+                        <a:spcAft>
+                          <a:spcPts val="0"/>
+                        </a:spcAft>
+                      </a:pPr>
+                      <a:r>
+                        <a:rPr lang="en-US" sz="1400" dirty="0" smtClean="0">
+                          <a:effectLst/>
+                          <a:latin typeface="Calibri" pitchFamily="34" charset="0"/>
+                          <a:cs typeface="Calibri" pitchFamily="34" charset="0"/>
+                        </a:rPr>
+                        <a:t>1x</a:t>
                       </a:r>
                       <a:endParaRPr lang="en-US" sz="1100" dirty="0">
                         <a:effectLst/>
@@ -7621,12 +7914,12 @@
                         </a:spcAft>
                       </a:pPr>
                       <a:r>
-                        <a:rPr lang="en-US" sz="1400" dirty="0">
+                        <a:rPr lang="en-US" sz="1400" dirty="0" smtClean="0">
                           <a:effectLst/>
                           <a:latin typeface="Calibri" pitchFamily="34" charset="0"/>
                           <a:cs typeface="Calibri" pitchFamily="34" charset="0"/>
                         </a:rPr>
-                        <a:t>1</a:t>
+                        <a:t>1x</a:t>
                       </a:r>
                       <a:endParaRPr lang="en-US" sz="1100" dirty="0">
                         <a:effectLst/>
@@ -7726,12 +8019,12 @@
                         </a:spcAft>
                       </a:pPr>
                       <a:r>
-                        <a:rPr lang="en-US" sz="1400" dirty="0">
+                        <a:rPr lang="en-US" sz="1400" dirty="0" smtClean="0">
                           <a:effectLst/>
                           <a:latin typeface="Calibri" pitchFamily="34" charset="0"/>
                           <a:cs typeface="Calibri" pitchFamily="34" charset="0"/>
                         </a:rPr>
-                        <a:t>1</a:t>
+                        <a:t>1x</a:t>
                       </a:r>
                       <a:endParaRPr lang="en-US" sz="1100" dirty="0">
                         <a:effectLst/>
@@ -7796,12 +8089,12 @@
                         </a:spcAft>
                       </a:pPr>
                       <a:r>
-                        <a:rPr lang="en-US" sz="1400" dirty="0">
+                        <a:rPr lang="en-US" sz="1400" dirty="0" smtClean="0">
                           <a:effectLst/>
                           <a:latin typeface="Calibri" pitchFamily="34" charset="0"/>
                           <a:cs typeface="Calibri" pitchFamily="34" charset="0"/>
                         </a:rPr>
-                        <a:t>1</a:t>
+                        <a:t>1x</a:t>
                       </a:r>
                       <a:endParaRPr lang="en-US" sz="1100" dirty="0">
                         <a:effectLst/>
@@ -7830,12 +8123,12 @@
                         </a:spcAft>
                       </a:pPr>
                       <a:r>
-                        <a:rPr lang="en-US" sz="1400" dirty="0">
+                        <a:rPr lang="en-US" sz="1400" dirty="0" smtClean="0">
                           <a:effectLst/>
                           <a:latin typeface="Calibri" pitchFamily="34" charset="0"/>
                           <a:cs typeface="Calibri" pitchFamily="34" charset="0"/>
                         </a:rPr>
-                        <a:t>2</a:t>
+                        <a:t>2x</a:t>
                       </a:r>
                       <a:endParaRPr lang="en-US" sz="1100" dirty="0">
                         <a:effectLst/>
@@ -8017,7 +8310,7 @@
                           <a:latin typeface="Calibri" pitchFamily="34" charset="0"/>
                           <a:cs typeface="Calibri" pitchFamily="34" charset="0"/>
                         </a:rPr>
-                        <a:t>1</a:t>
+                        <a:t>1x</a:t>
                       </a:r>
                       <a:endParaRPr lang="en-US" sz="1100" dirty="0">
                         <a:effectLst/>
@@ -8051,7 +8344,7 @@
                           <a:latin typeface="Calibri" pitchFamily="34" charset="0"/>
                           <a:cs typeface="Calibri" pitchFamily="34" charset="0"/>
                         </a:rPr>
-                        <a:t>3</a:t>
+                        <a:t>3x</a:t>
                       </a:r>
                       <a:endParaRPr lang="en-US" sz="1100" dirty="0">
                         <a:effectLst/>
@@ -8091,14 +8384,14 @@
           <a:effectLst/>
           <a:extLst>
             <a:ext uri="{909E8E84-426E-40DD-AFC4-6F175D3DCCD1}">
-              <a14:hiddenFill xmlns:a14="http://schemas.microsoft.com/office/drawing/2010/main" xmlns="">
+              <a14:hiddenFill xmlns="" xmlns:a14="http://schemas.microsoft.com/office/drawing/2010/main">
                 <a:solidFill>
                   <a:schemeClr val="accent1"/>
                 </a:solidFill>
               </a14:hiddenFill>
             </a:ext>
             <a:ext uri="{91240B29-F687-4F45-9708-019B960494DF}">
-              <a14:hiddenLine xmlns:a14="http://schemas.microsoft.com/office/drawing/2010/main" xmlns="" w="9525">
+              <a14:hiddenLine xmlns="" xmlns:a14="http://schemas.microsoft.com/office/drawing/2010/main" w="9525">
                 <a:solidFill>
                   <a:schemeClr val="tx1"/>
                 </a:solidFill>
@@ -8108,7 +8401,7 @@
               </a14:hiddenLine>
             </a:ext>
             <a:ext uri="{AF507438-7753-43E0-B8FC-AC1667EBCBE1}">
-              <a14:hiddenEffects xmlns:a14="http://schemas.microsoft.com/office/drawing/2010/main" xmlns="">
+              <a14:hiddenEffects xmlns="" xmlns:a14="http://schemas.microsoft.com/office/drawing/2010/main">
                 <a:effectLst>
                   <a:outerShdw dist="35921" dir="2700000" algn="ctr" rotWithShape="0">
                     <a:schemeClr val="bg2"/>
@@ -8160,7 +8453,7 @@
     </p:spTree>
     <p:extLst>
       <p:ext uri="{BB962C8B-B14F-4D97-AF65-F5344CB8AC3E}">
-        <p14:creationId xmlns:p14="http://schemas.microsoft.com/office/powerpoint/2010/main" xmlns="" val="3416953927"/>
+        <p14:creationId xmlns="" xmlns:p14="http://schemas.microsoft.com/office/powerpoint/2010/main" val="3416953927"/>
       </p:ext>
     </p:extLst>
   </p:cSld>
@@ -8280,31 +8573,7 @@
               <a:rPr lang="en-US" sz="2400" kern="1200" dirty="0" smtClean="0">
                 <a:ea typeface="+mn-ea"/>
               </a:rPr>
-              <a:t>Efficient </a:t>
-            </a:r>
-            <a:r>
-              <a:rPr lang="en-US" sz="2400" kern="1200" dirty="0" smtClean="0">
-                <a:ea typeface="+mn-ea"/>
-              </a:rPr>
-              <a:t>signal-processing calculations; Fixed-point </a:t>
-            </a:r>
-            <a:r>
-              <a:rPr lang="en-US" sz="2400" kern="1200" dirty="0" smtClean="0">
-                <a:ea typeface="+mn-ea"/>
-              </a:rPr>
-              <a:t>or </a:t>
-            </a:r>
-            <a:r>
-              <a:rPr lang="en-US" sz="2400" kern="1200" dirty="0" smtClean="0">
-                <a:ea typeface="+mn-ea"/>
-              </a:rPr>
-              <a:t>floating-point </a:t>
-            </a:r>
-            <a:r>
-              <a:rPr lang="en-US" sz="2400" kern="1200" dirty="0" smtClean="0">
-                <a:ea typeface="+mn-ea"/>
-              </a:rPr>
-              <a:t>or both</a:t>
+              <a:t>Efficient signal-processing calculations; Fixed-point or floating-point or both</a:t>
             </a:r>
           </a:p>
           <a:p>
@@ -8325,9 +8594,6 @@
               </a:rPr>
               <a:t>Efficient power and performance:</a:t>
             </a:r>
-            <a:endParaRPr lang="en-US" sz="2400" kern="1200" dirty="0" smtClean="0">
-              <a:ea typeface="+mn-ea"/>
-            </a:endParaRPr>
           </a:p>
           <a:p>
             <a:pPr marL="742950" lvl="1" indent="-285750">
@@ -8347,9 +8613,6 @@
               </a:rPr>
               <a:t>ARM A15 has high processing-to-power ratio</a:t>
             </a:r>
-            <a:endParaRPr lang="en-US" sz="2000" kern="1200" dirty="0" smtClean="0">
-              <a:ea typeface="+mn-ea"/>
-            </a:endParaRPr>
           </a:p>
           <a:p>
             <a:pPr marL="742950" lvl="1" indent="-285750">
@@ -8367,19 +8630,7 @@
               <a:rPr lang="en-US" sz="2000" kern="1200" dirty="0" smtClean="0">
                 <a:ea typeface="+mn-ea"/>
               </a:rPr>
-              <a:t>NET</a:t>
-            </a:r>
-            <a:r>
-              <a:rPr lang="en-US" sz="2000" kern="1200" dirty="0" smtClean="0">
-                <a:ea typeface="+mn-ea"/>
-              </a:rPr>
-              <a:t>CP</a:t>
-            </a:r>
-            <a:r>
-              <a:rPr lang="en-US" sz="2000" kern="1200" dirty="0" smtClean="0">
-                <a:ea typeface="+mn-ea"/>
-              </a:rPr>
-              <a:t> offloads network processing</a:t>
+              <a:t>NETCP offloads network processing</a:t>
             </a:r>
             <a:endParaRPr lang="en-US" sz="2400" kern="1200" dirty="0" smtClean="0"/>
           </a:p>
@@ -8479,7 +8730,7 @@
     </p:spTree>
     <p:extLst>
       <p:ext uri="{BB962C8B-B14F-4D97-AF65-F5344CB8AC3E}">
-        <p14:creationId xmlns:p14="http://schemas.microsoft.com/office/powerpoint/2010/main" xmlns="" val="821418795"/>
+        <p14:creationId xmlns="" xmlns:p14="http://schemas.microsoft.com/office/powerpoint/2010/main" val="821418795"/>
       </p:ext>
     </p:extLst>
   </p:cSld>
@@ -8830,7 +9081,7 @@
     </p:custDataLst>
     <p:extLst>
       <p:ext uri="{BB962C8B-B14F-4D97-AF65-F5344CB8AC3E}">
-        <p14:creationId xmlns:p14="http://schemas.microsoft.com/office/powerpoint/2010/main" xmlns="" val="3691244631"/>
+        <p14:creationId xmlns="" xmlns:p14="http://schemas.microsoft.com/office/powerpoint/2010/main" val="3691244631"/>
       </p:ext>
     </p:extLst>
   </p:cSld>
@@ -9308,7 +9559,7 @@
     </p:custDataLst>
     <p:extLst>
       <p:ext uri="{BB962C8B-B14F-4D97-AF65-F5344CB8AC3E}">
-        <p14:creationId xmlns:p14="http://schemas.microsoft.com/office/powerpoint/2010/main" xmlns="" val="856361381"/>
+        <p14:creationId xmlns="" xmlns:p14="http://schemas.microsoft.com/office/powerpoint/2010/main" val="856361381"/>
       </p:ext>
     </p:extLst>
   </p:cSld>
@@ -9395,14 +9646,14 @@
           <a:effectLst/>
           <a:extLst>
             <a:ext uri="{909E8E84-426E-40DD-AFC4-6F175D3DCCD1}">
-              <a14:hiddenFill xmlns:a14="http://schemas.microsoft.com/office/drawing/2010/main" xmlns="">
+              <a14:hiddenFill xmlns="" xmlns:a14="http://schemas.microsoft.com/office/drawing/2010/main">
                 <a:solidFill>
                   <a:schemeClr val="accent1"/>
                 </a:solidFill>
               </a14:hiddenFill>
             </a:ext>
             <a:ext uri="{91240B29-F687-4F45-9708-019B960494DF}">
-              <a14:hiddenLine xmlns:a14="http://schemas.microsoft.com/office/drawing/2010/main" xmlns="" w="9525">
+              <a14:hiddenLine xmlns="" xmlns:a14="http://schemas.microsoft.com/office/drawing/2010/main" w="9525">
                 <a:solidFill>
                   <a:schemeClr val="tx1"/>
                 </a:solidFill>
@@ -9412,7 +9663,7 @@
               </a14:hiddenLine>
             </a:ext>
             <a:ext uri="{AF507438-7753-43E0-B8FC-AC1667EBCBE1}">
-              <a14:hiddenEffects xmlns:a14="http://schemas.microsoft.com/office/drawing/2010/main" xmlns="">
+              <a14:hiddenEffects xmlns="" xmlns:a14="http://schemas.microsoft.com/office/drawing/2010/main">
                 <a:effectLst>
                   <a:outerShdw dist="35921" dir="2700000" algn="ctr" rotWithShape="0">
                     <a:schemeClr val="bg2"/>
@@ -9470,7 +9721,7 @@
           <p:nvPr>
             <p:extLst>
               <p:ext uri="{D42A27DB-BD31-4B8C-83A1-F6EECF244321}">
-                <p14:modId xmlns:p14="http://schemas.microsoft.com/office/powerpoint/2010/main" xmlns="" val="3829498261"/>
+                <p14:modId xmlns="" xmlns:p14="http://schemas.microsoft.com/office/powerpoint/2010/main" val="3829498261"/>
               </p:ext>
             </p:extLst>
           </p:nvPr>
@@ -9481,7 +9732,7 @@
         </p:xfrm>
         <a:graphic>
           <a:graphicData uri="http://schemas.openxmlformats.org/presentationml/2006/ole">
-            <p:oleObj spid="_x0000_s84997" name="Visio" r:id="rId3" imgW="8321715" imgH="6803957" progId="">
+            <p:oleObj spid="_x0000_s84997" name="Visio" r:id="rId3" imgW="8321715" imgH="6803957" progId="Visio.Drawing.11">
               <p:embed/>
             </p:oleObj>
           </a:graphicData>
@@ -9519,7 +9770,7 @@
     </p:spTree>
     <p:extLst>
       <p:ext uri="{BB962C8B-B14F-4D97-AF65-F5344CB8AC3E}">
-        <p14:creationId xmlns:p14="http://schemas.microsoft.com/office/powerpoint/2010/main" xmlns="" val="1580231294"/>
+        <p14:creationId xmlns="" xmlns:p14="http://schemas.microsoft.com/office/powerpoint/2010/main" val="1580231294"/>
       </p:ext>
     </p:extLst>
   </p:cSld>
@@ -9784,7 +10035,7 @@
     </p:custDataLst>
     <p:extLst>
       <p:ext uri="{BB962C8B-B14F-4D97-AF65-F5344CB8AC3E}">
-        <p14:creationId xmlns:p14="http://schemas.microsoft.com/office/powerpoint/2010/main" xmlns="" val="2071910042"/>
+        <p14:creationId xmlns="" xmlns:p14="http://schemas.microsoft.com/office/powerpoint/2010/main" val="2071910042"/>
       </p:ext>
     </p:extLst>
   </p:cSld>
@@ -10032,10 +10283,6 @@
               </a:rPr>
               <a:t>)</a:t>
             </a:r>
-            <a:endParaRPr lang="en-US" sz="2400" dirty="0" smtClean="0">
-              <a:latin typeface="Calibri" pitchFamily="34" charset="0"/>
-              <a:cs typeface="Calibri" pitchFamily="34" charset="0"/>
-            </a:endParaRPr>
           </a:p>
           <a:p>
             <a:pPr marL="285750" lvl="0" indent="-285750">
@@ -10139,7 +10386,7 @@
     </p:custDataLst>
     <p:extLst>
       <p:ext uri="{BB962C8B-B14F-4D97-AF65-F5344CB8AC3E}">
-        <p14:creationId xmlns:p14="http://schemas.microsoft.com/office/powerpoint/2010/main" xmlns="" val="3238446912"/>
+        <p14:creationId xmlns="" xmlns:p14="http://schemas.microsoft.com/office/powerpoint/2010/main" val="3238446912"/>
       </p:ext>
     </p:extLst>
   </p:cSld>
@@ -10226,14 +10473,14 @@
           <a:effectLst/>
           <a:extLst>
             <a:ext uri="{909E8E84-426E-40DD-AFC4-6F175D3DCCD1}">
-              <a14:hiddenFill xmlns:a14="http://schemas.microsoft.com/office/drawing/2010/main" xmlns="">
+              <a14:hiddenFill xmlns="" xmlns:a14="http://schemas.microsoft.com/office/drawing/2010/main">
                 <a:solidFill>
                   <a:schemeClr val="accent1"/>
                 </a:solidFill>
               </a14:hiddenFill>
             </a:ext>
             <a:ext uri="{91240B29-F687-4F45-9708-019B960494DF}">
-              <a14:hiddenLine xmlns:a14="http://schemas.microsoft.com/office/drawing/2010/main" xmlns="" w="9525">
+              <a14:hiddenLine xmlns="" xmlns:a14="http://schemas.microsoft.com/office/drawing/2010/main" w="9525">
                 <a:solidFill>
                   <a:schemeClr val="tx1"/>
                 </a:solidFill>
@@ -10243,7 +10490,7 @@
               </a14:hiddenLine>
             </a:ext>
             <a:ext uri="{AF507438-7753-43E0-B8FC-AC1667EBCBE1}">
-              <a14:hiddenEffects xmlns:a14="http://schemas.microsoft.com/office/drawing/2010/main" xmlns="">
+              <a14:hiddenEffects xmlns="" xmlns:a14="http://schemas.microsoft.com/office/drawing/2010/main">
                 <a:effectLst>
                   <a:outerShdw dist="35921" dir="2700000" algn="ctr" rotWithShape="0">
                     <a:schemeClr val="bg2"/>
@@ -10301,7 +10548,7 @@
           <p:nvPr>
             <p:extLst>
               <p:ext uri="{D42A27DB-BD31-4B8C-83A1-F6EECF244321}">
-                <p14:modId xmlns:p14="http://schemas.microsoft.com/office/powerpoint/2010/main" xmlns="" val="601772777"/>
+                <p14:modId xmlns="" xmlns:p14="http://schemas.microsoft.com/office/powerpoint/2010/main" val="601772777"/>
               </p:ext>
             </p:extLst>
           </p:nvPr>
@@ -10312,7 +10559,7 @@
         </p:xfrm>
         <a:graphic>
           <a:graphicData uri="http://schemas.openxmlformats.org/presentationml/2006/ole">
-            <p:oleObj spid="_x0000_s86021" name="Visio" r:id="rId3" imgW="8321715" imgH="6803957" progId="">
+            <p:oleObj spid="_x0000_s86021" name="Visio" r:id="rId3" imgW="8321715" imgH="6803957" progId="Visio.Drawing.11">
               <p:embed/>
             </p:oleObj>
           </a:graphicData>
@@ -10350,7 +10597,7 @@
     </p:spTree>
     <p:extLst>
       <p:ext uri="{BB962C8B-B14F-4D97-AF65-F5344CB8AC3E}">
-        <p14:creationId xmlns:p14="http://schemas.microsoft.com/office/powerpoint/2010/main" xmlns="" val="1958137510"/>
+        <p14:creationId xmlns="" xmlns:p14="http://schemas.microsoft.com/office/powerpoint/2010/main" val="1958137510"/>
       </p:ext>
     </p:extLst>
   </p:cSld>
@@ -10470,14 +10717,7 @@
                 <a:latin typeface="Calibri" pitchFamily="34" charset="0"/>
                 <a:cs typeface="Calibri" pitchFamily="34" charset="0"/>
               </a:rPr>
-              <a:t> </a:t>
-            </a:r>
-            <a:r>
-              <a:rPr lang="en-US" sz="2400" dirty="0" smtClean="0">
-                <a:latin typeface="Calibri" pitchFamily="34" charset="0"/>
-                <a:cs typeface="Calibri" pitchFamily="34" charset="0"/>
-              </a:rPr>
-              <a:t>device (First in the </a:t>
+              <a:t> device (First in the </a:t>
             </a:r>
             <a:r>
               <a:rPr lang="en-US" sz="2400" dirty="0" err="1" smtClean="0">
@@ -10493,10 +10733,6 @@
               </a:rPr>
               <a:t> architecture)</a:t>
             </a:r>
-            <a:endParaRPr lang="en-US" sz="2400" dirty="0" smtClean="0">
-              <a:latin typeface="Calibri" pitchFamily="34" charset="0"/>
-              <a:cs typeface="Calibri" pitchFamily="34" charset="0"/>
-            </a:endParaRPr>
           </a:p>
           <a:p>
             <a:pPr marL="285750" lvl="1" indent="-285750">
@@ -10699,7 +10935,7 @@
     </p:custDataLst>
     <p:extLst>
       <p:ext uri="{BB962C8B-B14F-4D97-AF65-F5344CB8AC3E}">
-        <p14:creationId xmlns:p14="http://schemas.microsoft.com/office/powerpoint/2010/main" xmlns="" val="873099895"/>
+        <p14:creationId xmlns="" xmlns:p14="http://schemas.microsoft.com/office/powerpoint/2010/main" val="873099895"/>
       </p:ext>
     </p:extLst>
   </p:cSld>
@@ -10795,13 +11031,8 @@
           <a:p>
             <a:r>
               <a:rPr lang="en-US" sz="2800" dirty="0" smtClean="0"/>
-              <a:t>K2E </a:t>
+              <a:t>K2E Software</a:t>
             </a:r>
-            <a:r>
-              <a:rPr lang="en-US" sz="2800" dirty="0" smtClean="0"/>
-              <a:t>Software</a:t>
-            </a:r>
-            <a:endParaRPr lang="en-US" sz="2800" dirty="0" smtClean="0"/>
           </a:p>
           <a:p>
             <a:r>
@@ -11178,7 +11409,7 @@
     </p:custDataLst>
     <p:extLst>
       <p:ext uri="{BB962C8B-B14F-4D97-AF65-F5344CB8AC3E}">
-        <p14:creationId xmlns:p14="http://schemas.microsoft.com/office/powerpoint/2010/main" xmlns="" val="3461455567"/>
+        <p14:creationId xmlns="" xmlns:p14="http://schemas.microsoft.com/office/powerpoint/2010/main" val="3461455567"/>
       </p:ext>
     </p:extLst>
   </p:cSld>
@@ -11324,14 +11555,7 @@
                 <a:latin typeface="Calibri" pitchFamily="34" charset="0"/>
                 <a:cs typeface="Calibri" pitchFamily="34" charset="0"/>
               </a:rPr>
-              <a:t>High-performance </a:t>
-            </a:r>
-            <a:r>
-              <a:rPr lang="en-US" sz="2000" dirty="0" smtClean="0">
-                <a:latin typeface="Calibri" pitchFamily="34" charset="0"/>
-                <a:cs typeface="Calibri" pitchFamily="34" charset="0"/>
-              </a:rPr>
-              <a:t>processing</a:t>
+              <a:t>High-performance processing</a:t>
             </a:r>
           </a:p>
           <a:p>
@@ -11451,14 +11675,7 @@
                 <a:latin typeface="Calibri" pitchFamily="34" charset="0"/>
                 <a:cs typeface="Calibri" pitchFamily="34" charset="0"/>
               </a:rPr>
-              <a:t>Efficient </a:t>
-            </a:r>
-            <a:r>
-              <a:rPr lang="en-US" sz="2000" dirty="0" smtClean="0">
-                <a:latin typeface="Calibri" pitchFamily="34" charset="0"/>
-                <a:cs typeface="Calibri" pitchFamily="34" charset="0"/>
-              </a:rPr>
-              <a:t>memory and internal bus utilization (MSMC, TeraNet)  </a:t>
+              <a:t>Efficient memory and internal bus utilization (MSMC, TeraNet)  </a:t>
             </a:r>
           </a:p>
           <a:p>
@@ -11478,14 +11695,7 @@
                 <a:latin typeface="Calibri" pitchFamily="34" charset="0"/>
                 <a:cs typeface="Calibri" pitchFamily="34" charset="0"/>
               </a:rPr>
-              <a:t>Support </a:t>
-            </a:r>
-            <a:r>
-              <a:rPr lang="en-US" sz="2000" dirty="0" smtClean="0">
-                <a:latin typeface="Calibri" pitchFamily="34" charset="0"/>
-                <a:cs typeface="Calibri" pitchFamily="34" charset="0"/>
-              </a:rPr>
-              <a:t>for big </a:t>
+              <a:t>Support for big </a:t>
             </a:r>
             <a:r>
               <a:rPr lang="en-US" sz="2000" dirty="0">
@@ -11566,7 +11776,7 @@
     </p:custDataLst>
     <p:extLst>
       <p:ext uri="{BB962C8B-B14F-4D97-AF65-F5344CB8AC3E}">
-        <p14:creationId xmlns:p14="http://schemas.microsoft.com/office/powerpoint/2010/main" xmlns="" val="3461455567"/>
+        <p14:creationId xmlns="" xmlns:p14="http://schemas.microsoft.com/office/powerpoint/2010/main" val="3461455567"/>
       </p:ext>
     </p:extLst>
   </p:cSld>
@@ -11653,14 +11863,14 @@
           <a:effectLst/>
           <a:extLst>
             <a:ext uri="{909E8E84-426E-40DD-AFC4-6F175D3DCCD1}">
-              <a14:hiddenFill xmlns:a14="http://schemas.microsoft.com/office/drawing/2010/main" xmlns="">
+              <a14:hiddenFill xmlns="" xmlns:a14="http://schemas.microsoft.com/office/drawing/2010/main">
                 <a:solidFill>
                   <a:schemeClr val="accent1"/>
                 </a:solidFill>
               </a14:hiddenFill>
             </a:ext>
             <a:ext uri="{91240B29-F687-4F45-9708-019B960494DF}">
-              <a14:hiddenLine xmlns:a14="http://schemas.microsoft.com/office/drawing/2010/main" xmlns="" w="9525">
+              <a14:hiddenLine xmlns="" xmlns:a14="http://schemas.microsoft.com/office/drawing/2010/main" w="9525">
                 <a:solidFill>
                   <a:schemeClr val="tx1"/>
                 </a:solidFill>
@@ -11670,7 +11880,7 @@
               </a14:hiddenLine>
             </a:ext>
             <a:ext uri="{AF507438-7753-43E0-B8FC-AC1667EBCBE1}">
-              <a14:hiddenEffects xmlns:a14="http://schemas.microsoft.com/office/drawing/2010/main" xmlns="">
+              <a14:hiddenEffects xmlns="" xmlns:a14="http://schemas.microsoft.com/office/drawing/2010/main">
                 <a:effectLst>
                   <a:outerShdw dist="35921" dir="2700000" algn="ctr" rotWithShape="0">
                     <a:schemeClr val="bg2"/>
@@ -11728,7 +11938,7 @@
           <p:nvPr>
             <p:extLst>
               <p:ext uri="{D42A27DB-BD31-4B8C-83A1-F6EECF244321}">
-                <p14:modId xmlns:p14="http://schemas.microsoft.com/office/powerpoint/2010/main" xmlns="" val="1983457263"/>
+                <p14:modId xmlns="" xmlns:p14="http://schemas.microsoft.com/office/powerpoint/2010/main" val="1983457263"/>
               </p:ext>
             </p:extLst>
           </p:nvPr>
@@ -11739,7 +11949,7 @@
         </p:xfrm>
         <a:graphic>
           <a:graphicData uri="http://schemas.openxmlformats.org/presentationml/2006/ole">
-            <p:oleObj spid="_x0000_s87045" name="Visio" r:id="rId3" imgW="8321715" imgH="6803957" progId="">
+            <p:oleObj spid="_x0000_s87045" name="Visio" r:id="rId3" imgW="8321715" imgH="6803957" progId="Visio.Drawing.11">
               <p:embed/>
             </p:oleObj>
           </a:graphicData>
@@ -11748,7 +11958,7 @@
     </p:spTree>
     <p:extLst>
       <p:ext uri="{BB962C8B-B14F-4D97-AF65-F5344CB8AC3E}">
-        <p14:creationId xmlns:p14="http://schemas.microsoft.com/office/powerpoint/2010/main" xmlns="" val="3802289127"/>
+        <p14:creationId xmlns="" xmlns:p14="http://schemas.microsoft.com/office/powerpoint/2010/main" val="3802289127"/>
       </p:ext>
     </p:extLst>
   </p:cSld>
@@ -12038,7 +12248,7 @@
     </p:custDataLst>
     <p:extLst>
       <p:ext uri="{BB962C8B-B14F-4D97-AF65-F5344CB8AC3E}">
-        <p14:creationId xmlns:p14="http://schemas.microsoft.com/office/powerpoint/2010/main" xmlns="" val="2835436665"/>
+        <p14:creationId xmlns="" xmlns:p14="http://schemas.microsoft.com/office/powerpoint/2010/main" val="2835436665"/>
       </p:ext>
     </p:extLst>
   </p:cSld>
@@ -12125,14 +12335,14 @@
           <a:effectLst/>
           <a:extLst>
             <a:ext uri="{909E8E84-426E-40DD-AFC4-6F175D3DCCD1}">
-              <a14:hiddenFill xmlns:a14="http://schemas.microsoft.com/office/drawing/2010/main" xmlns="">
+              <a14:hiddenFill xmlns="" xmlns:a14="http://schemas.microsoft.com/office/drawing/2010/main">
                 <a:solidFill>
                   <a:schemeClr val="accent1"/>
                 </a:solidFill>
               </a14:hiddenFill>
             </a:ext>
             <a:ext uri="{91240B29-F687-4F45-9708-019B960494DF}">
-              <a14:hiddenLine xmlns:a14="http://schemas.microsoft.com/office/drawing/2010/main" xmlns="" w="9525">
+              <a14:hiddenLine xmlns="" xmlns:a14="http://schemas.microsoft.com/office/drawing/2010/main" w="9525">
                 <a:solidFill>
                   <a:schemeClr val="tx1"/>
                 </a:solidFill>
@@ -12142,7 +12352,7 @@
               </a14:hiddenLine>
             </a:ext>
             <a:ext uri="{AF507438-7753-43E0-B8FC-AC1667EBCBE1}">
-              <a14:hiddenEffects xmlns:a14="http://schemas.microsoft.com/office/drawing/2010/main" xmlns="">
+              <a14:hiddenEffects xmlns="" xmlns:a14="http://schemas.microsoft.com/office/drawing/2010/main">
                 <a:effectLst>
                   <a:outerShdw dist="35921" dir="2700000" algn="ctr" rotWithShape="0">
                     <a:schemeClr val="bg2"/>
@@ -12200,7 +12410,7 @@
           <p:nvPr>
             <p:extLst>
               <p:ext uri="{D42A27DB-BD31-4B8C-83A1-F6EECF244321}">
-                <p14:modId xmlns:p14="http://schemas.microsoft.com/office/powerpoint/2010/main" xmlns="" val="2083442245"/>
+                <p14:modId xmlns="" xmlns:p14="http://schemas.microsoft.com/office/powerpoint/2010/main" val="2083442245"/>
               </p:ext>
             </p:extLst>
           </p:nvPr>
@@ -12211,7 +12421,7 @@
         </p:xfrm>
         <a:graphic>
           <a:graphicData uri="http://schemas.openxmlformats.org/presentationml/2006/ole">
-            <p:oleObj spid="_x0000_s88069" name="Visio" r:id="rId3" imgW="8321715" imgH="6803957" progId="">
+            <p:oleObj spid="_x0000_s88069" name="Visio" r:id="rId3" imgW="8321715" imgH="6803957" progId="Visio.Drawing.11">
               <p:embed/>
             </p:oleObj>
           </a:graphicData>
@@ -12220,7 +12430,7 @@
     </p:spTree>
     <p:extLst>
       <p:ext uri="{BB962C8B-B14F-4D97-AF65-F5344CB8AC3E}">
-        <p14:creationId xmlns:p14="http://schemas.microsoft.com/office/powerpoint/2010/main" xmlns="" val="3874421043"/>
+        <p14:creationId xmlns="" xmlns:p14="http://schemas.microsoft.com/office/powerpoint/2010/main" val="3874421043"/>
       </p:ext>
     </p:extLst>
   </p:cSld>
@@ -12272,11 +12482,7 @@
             <a:pPr algn="l"/>
             <a:r>
               <a:rPr lang="en-US" dirty="0" smtClean="0"/>
-              <a:t>K2E </a:t>
-            </a:r>
-            <a:r>
-              <a:rPr lang="en-US" dirty="0" smtClean="0"/>
-              <a:t>Software</a:t>
+              <a:t>K2E Software</a:t>
             </a:r>
             <a:endParaRPr lang="en-US" dirty="0"/>
           </a:p>
@@ -12627,19 +12833,7 @@
               <a:rPr lang="en-US" sz="2400" kern="1200" dirty="0" smtClean="0">
                 <a:ea typeface="+mn-ea"/>
               </a:rPr>
-              <a:t>Automatic setting of </a:t>
-            </a:r>
-            <a:r>
-              <a:rPr lang="en-US" sz="2400" kern="1200" dirty="0" smtClean="0">
-                <a:ea typeface="+mn-ea"/>
-              </a:rPr>
-              <a:t>EVM </a:t>
-            </a:r>
-            <a:r>
-              <a:rPr lang="en-US" sz="2400" kern="1200" dirty="0" smtClean="0">
-                <a:ea typeface="+mn-ea"/>
-              </a:rPr>
-              <a:t>frequency based on the chip EFUSE value instead of environment variable in </a:t>
+              <a:t>Automatic setting of EVM frequency based on the chip EFUSE value instead of environment variable in </a:t>
             </a:r>
             <a:r>
               <a:rPr lang="en-US" sz="2400" kern="1200" dirty="0" err="1" smtClean="0">
@@ -12656,7 +12850,7 @@
     </p:spTree>
     <p:extLst>
       <p:ext uri="{BB962C8B-B14F-4D97-AF65-F5344CB8AC3E}">
-        <p14:creationId xmlns:p14="http://schemas.microsoft.com/office/powerpoint/2010/main" xmlns="" val="2660321590"/>
+        <p14:creationId xmlns="" xmlns:p14="http://schemas.microsoft.com/office/powerpoint/2010/main" val="2660321590"/>
       </p:ext>
     </p:extLst>
   </p:cSld>
@@ -13153,14 +13347,7 @@
                 <a:latin typeface="Calibri" pitchFamily="34" charset="0"/>
                 <a:cs typeface="Calibri" pitchFamily="34" charset="0"/>
               </a:rPr>
-              <a:t>High-performance </a:t>
-            </a:r>
-            <a:r>
-              <a:rPr lang="en-US" dirty="0" smtClean="0">
-                <a:latin typeface="Calibri" pitchFamily="34" charset="0"/>
-                <a:cs typeface="Calibri" pitchFamily="34" charset="0"/>
-              </a:rPr>
-              <a:t>ARM + DSP</a:t>
+              <a:t>High-performance ARM + DSP</a:t>
             </a:r>
           </a:p>
           <a:p>
@@ -13173,19 +13360,8 @@
                 <a:latin typeface="Calibri" pitchFamily="34" charset="0"/>
                 <a:cs typeface="Calibri" pitchFamily="34" charset="0"/>
               </a:rPr>
-              <a:t>Memory </a:t>
+              <a:t>Memory Subsystem:</a:t>
             </a:r>
-            <a:r>
-              <a:rPr lang="en-US" dirty="0" smtClean="0">
-                <a:latin typeface="Calibri" pitchFamily="34" charset="0"/>
-                <a:cs typeface="Calibri" pitchFamily="34" charset="0"/>
-              </a:rPr>
-              <a:t>Subsystem:</a:t>
-            </a:r>
-            <a:endParaRPr lang="en-US" dirty="0" smtClean="0">
-              <a:latin typeface="Calibri" pitchFamily="34" charset="0"/>
-              <a:cs typeface="Calibri" pitchFamily="34" charset="0"/>
-            </a:endParaRPr>
           </a:p>
           <a:p>
             <a:pPr marL="742950" lvl="1" indent="-285750">
@@ -13275,19 +13451,8 @@
                 <a:latin typeface="Calibri" pitchFamily="34" charset="0"/>
                 <a:cs typeface="Calibri" pitchFamily="34" charset="0"/>
               </a:rPr>
-              <a:t>Lots of </a:t>
+              <a:t>Lots of connectivity:</a:t>
             </a:r>
-            <a:r>
-              <a:rPr lang="en-US" dirty="0" smtClean="0">
-                <a:latin typeface="Calibri" pitchFamily="34" charset="0"/>
-                <a:cs typeface="Calibri" pitchFamily="34" charset="0"/>
-              </a:rPr>
-              <a:t>connectivity:</a:t>
-            </a:r>
-            <a:endParaRPr lang="en-US" dirty="0" smtClean="0">
-              <a:latin typeface="Calibri" pitchFamily="34" charset="0"/>
-              <a:cs typeface="Calibri" pitchFamily="34" charset="0"/>
-            </a:endParaRPr>
           </a:p>
           <a:p>
             <a:pPr marL="742950" lvl="1" indent="-285750">
@@ -13299,21 +13464,7 @@
                 <a:latin typeface="Calibri" pitchFamily="34" charset="0"/>
                 <a:cs typeface="Calibri" pitchFamily="34" charset="0"/>
               </a:rPr>
-              <a:t>High bit-rate peripherals: SRIO, PCIe</a:t>
-            </a:r>
-            <a:r>
-              <a:rPr lang="en-US" dirty="0" smtClean="0">
-                <a:latin typeface="Calibri" pitchFamily="34" charset="0"/>
-                <a:cs typeface="Calibri" pitchFamily="34" charset="0"/>
-              </a:rPr>
-              <a:t>, </a:t>
-            </a:r>
-            <a:r>
-              <a:rPr lang="en-US" dirty="0" smtClean="0">
-                <a:latin typeface="Calibri" pitchFamily="34" charset="0"/>
-                <a:cs typeface="Calibri" pitchFamily="34" charset="0"/>
-              </a:rPr>
-              <a:t>Ethernet</a:t>
+              <a:t>High bit-rate peripherals: SRIO, PCIe, Ethernet</a:t>
             </a:r>
           </a:p>
           <a:p>
@@ -13328,10 +13479,6 @@
               </a:rPr>
               <a:t>Device-specific: TSIP  </a:t>
             </a:r>
-            <a:endParaRPr lang="en-US" dirty="0" smtClean="0">
-              <a:latin typeface="Calibri" pitchFamily="34" charset="0"/>
-              <a:cs typeface="Calibri" pitchFamily="34" charset="0"/>
-            </a:endParaRPr>
           </a:p>
           <a:p>
             <a:pPr marL="742950" lvl="1" indent="-285750">
@@ -13363,14 +13510,7 @@
                 <a:latin typeface="Calibri" pitchFamily="34" charset="0"/>
                 <a:cs typeface="Calibri" pitchFamily="34" charset="0"/>
               </a:rPr>
-              <a:t>TeraNet</a:t>
-            </a:r>
-            <a:r>
-              <a:rPr lang="en-US" dirty="0" smtClean="0">
-                <a:latin typeface="Calibri" pitchFamily="34" charset="0"/>
-                <a:cs typeface="Calibri" pitchFamily="34" charset="0"/>
-              </a:rPr>
-              <a:t>:</a:t>
+              <a:t>TeraNet:</a:t>
             </a:r>
           </a:p>
           <a:p>
@@ -13414,30 +13554,6 @@
           </a:p>
         </p:txBody>
       </p:sp>
-      <p:pic>
-        <p:nvPicPr>
-          <p:cNvPr id="5" name="Picture 4" descr="Func Diagram KII P10.bmp"/>
-          <p:cNvPicPr>
-            <a:picLocks noChangeAspect="1"/>
-          </p:cNvPicPr>
-          <p:nvPr/>
-        </p:nvPicPr>
-        <p:blipFill>
-          <a:blip r:embed="rId2" cstate="print"/>
-          <a:stretch>
-            <a:fillRect/>
-          </a:stretch>
-        </p:blipFill>
-        <p:spPr>
-          <a:xfrm>
-            <a:off x="0" y="870507"/>
-            <a:ext cx="5338440" cy="5449824"/>
-          </a:xfrm>
-          <a:prstGeom prst="rect">
-            <a:avLst/>
-          </a:prstGeom>
-        </p:spPr>
-      </p:pic>
       <p:sp>
         <p:nvSpPr>
           <p:cNvPr id="6" name="Slide Number Placeholder 3"/>
@@ -13467,10 +13583,34 @@
           </a:p>
         </p:txBody>
       </p:sp>
+      <p:pic>
+        <p:nvPicPr>
+          <p:cNvPr id="7" name="Picture 6" descr="Func Diagram KII Hawking Generic.bmp"/>
+          <p:cNvPicPr>
+            <a:picLocks noChangeAspect="1"/>
+          </p:cNvPicPr>
+          <p:nvPr/>
+        </p:nvPicPr>
+        <p:blipFill>
+          <a:blip r:embed="rId2" cstate="print"/>
+          <a:stretch>
+            <a:fillRect/>
+          </a:stretch>
+        </p:blipFill>
+        <p:spPr>
+          <a:xfrm>
+            <a:off x="0" y="863052"/>
+            <a:ext cx="5341039" cy="5449824"/>
+          </a:xfrm>
+          <a:prstGeom prst="rect">
+            <a:avLst/>
+          </a:prstGeom>
+        </p:spPr>
+      </p:pic>
     </p:spTree>
     <p:extLst>
       <p:ext uri="{BB962C8B-B14F-4D97-AF65-F5344CB8AC3E}">
-        <p14:creationId xmlns:p14="http://schemas.microsoft.com/office/powerpoint/2010/main" xmlns="" val="2205743471"/>
+        <p14:creationId xmlns="" xmlns:p14="http://schemas.microsoft.com/office/powerpoint/2010/main" val="2205743471"/>
       </p:ext>
     </p:extLst>
   </p:cSld>
@@ -48334,13 +48474,6 @@
               </a:rPr>
               <a:t>, except:</a:t>
             </a:r>
-            <a:endParaRPr lang="en-US" b="1" dirty="0" smtClean="0">
-              <a:solidFill>
-                <a:srgbClr val="DE0000"/>
-              </a:solidFill>
-              <a:latin typeface="Calibri" pitchFamily="34" charset="0"/>
-              <a:cs typeface="Calibri" pitchFamily="34" charset="0"/>
-            </a:endParaRPr>
           </a:p>
           <a:p>
             <a:pPr marL="742950" lvl="1" indent="-285750">
@@ -48352,14 +48485,7 @@
                 <a:latin typeface="Calibri" pitchFamily="34" charset="0"/>
                 <a:cs typeface="Calibri" pitchFamily="34" charset="0"/>
               </a:rPr>
-              <a:t>Few</a:t>
-            </a:r>
-            <a:r>
-              <a:rPr lang="en-US" dirty="0" smtClean="0">
-                <a:latin typeface="Calibri" pitchFamily="34" charset="0"/>
-                <a:cs typeface="Calibri" pitchFamily="34" charset="0"/>
-              </a:rPr>
-              <a:t>, more generic, accelerators</a:t>
+              <a:t>Few, more generic, accelerators</a:t>
             </a:r>
           </a:p>
           <a:p>
@@ -48488,10 +48614,6 @@
               </a:rPr>
               <a:t>Power limitations (sealed box)</a:t>
             </a:r>
-            <a:endParaRPr lang="en-US" dirty="0" smtClean="0">
-              <a:latin typeface="Calibri" pitchFamily="34" charset="0"/>
-              <a:cs typeface="Calibri" pitchFamily="34" charset="0"/>
-            </a:endParaRPr>
           </a:p>
           <a:p>
             <a:pPr marL="285750" indent="-285750">
@@ -48629,7 +48751,7 @@
           <p:nvPr>
             <p:extLst>
               <p:ext uri="{D42A27DB-BD31-4B8C-83A1-F6EECF244321}">
-                <p14:modId xmlns:p14="http://schemas.microsoft.com/office/powerpoint/2010/main" xmlns="" val="4119681246"/>
+                <p14:modId xmlns="" xmlns:p14="http://schemas.microsoft.com/office/powerpoint/2010/main" val="4119681246"/>
               </p:ext>
             </p:extLst>
           </p:nvPr>
@@ -48640,7 +48762,7 @@
         </p:xfrm>
         <a:graphic>
           <a:graphicData uri="http://schemas.openxmlformats.org/presentationml/2006/ole">
-            <p:oleObj spid="_x0000_s82949" name="Visio" r:id="rId3" imgW="8321715" imgH="6803957" progId="">
+            <p:oleObj spid="_x0000_s82949" name="Visio" r:id="rId3" imgW="8321715" imgH="6803957" progId="Visio.Drawing.11">
               <p:embed/>
             </p:oleObj>
           </a:graphicData>
@@ -48752,7 +48874,7 @@
     </p:spTree>
     <p:extLst>
       <p:ext uri="{BB962C8B-B14F-4D97-AF65-F5344CB8AC3E}">
-        <p14:creationId xmlns:p14="http://schemas.microsoft.com/office/powerpoint/2010/main" xmlns="" val="2385042335"/>
+        <p14:creationId xmlns="" xmlns:p14="http://schemas.microsoft.com/office/powerpoint/2010/main" val="2385042335"/>
       </p:ext>
     </p:extLst>
   </p:cSld>
@@ -48839,14 +48961,14 @@
           <a:effectLst/>
           <a:extLst>
             <a:ext uri="{909E8E84-426E-40DD-AFC4-6F175D3DCCD1}">
-              <a14:hiddenFill xmlns:a14="http://schemas.microsoft.com/office/drawing/2010/main" xmlns="">
+              <a14:hiddenFill xmlns="" xmlns:a14="http://schemas.microsoft.com/office/drawing/2010/main">
                 <a:solidFill>
                   <a:schemeClr val="accent1"/>
                 </a:solidFill>
               </a14:hiddenFill>
             </a:ext>
             <a:ext uri="{91240B29-F687-4F45-9708-019B960494DF}">
-              <a14:hiddenLine xmlns:a14="http://schemas.microsoft.com/office/drawing/2010/main" xmlns="" w="9525">
+              <a14:hiddenLine xmlns="" xmlns:a14="http://schemas.microsoft.com/office/drawing/2010/main" w="9525">
                 <a:solidFill>
                   <a:schemeClr val="tx1"/>
                 </a:solidFill>
@@ -48856,7 +48978,7 @@
               </a14:hiddenLine>
             </a:ext>
             <a:ext uri="{AF507438-7753-43E0-B8FC-AC1667EBCBE1}">
-              <a14:hiddenEffects xmlns:a14="http://schemas.microsoft.com/office/drawing/2010/main" xmlns="">
+              <a14:hiddenEffects xmlns="" xmlns:a14="http://schemas.microsoft.com/office/drawing/2010/main">
                 <a:effectLst>
                   <a:outerShdw dist="35921" dir="2700000" algn="ctr" rotWithShape="0">
                     <a:schemeClr val="bg2"/>
@@ -48914,7 +49036,7 @@
           <p:nvPr>
             <p:extLst>
               <p:ext uri="{D42A27DB-BD31-4B8C-83A1-F6EECF244321}">
-                <p14:modId xmlns:p14="http://schemas.microsoft.com/office/powerpoint/2010/main" xmlns="" val="717525081"/>
+                <p14:modId xmlns="" xmlns:p14="http://schemas.microsoft.com/office/powerpoint/2010/main" val="717525081"/>
               </p:ext>
             </p:extLst>
           </p:nvPr>
@@ -48925,7 +49047,7 @@
         </p:xfrm>
         <a:graphic>
           <a:graphicData uri="http://schemas.openxmlformats.org/presentationml/2006/ole">
-            <p:oleObj spid="_x0000_s83973" name="Visio" r:id="rId3" imgW="8321715" imgH="6803957" progId="">
+            <p:oleObj spid="_x0000_s83973" name="Visio" r:id="rId3" imgW="8321715" imgH="6803957" progId="Visio.Drawing.11">
               <p:embed/>
             </p:oleObj>
           </a:graphicData>
@@ -48963,7 +49085,7 @@
     </p:spTree>
     <p:extLst>
       <p:ext uri="{BB962C8B-B14F-4D97-AF65-F5344CB8AC3E}">
-        <p14:creationId xmlns:p14="http://schemas.microsoft.com/office/powerpoint/2010/main" xmlns="" val="799163121"/>
+        <p14:creationId xmlns="" xmlns:p14="http://schemas.microsoft.com/office/powerpoint/2010/main" val="799163121"/>
       </p:ext>
     </p:extLst>
   </p:cSld>

</xml_diff>